<commit_message>
ttest added, slide changed, etc.
</commit_message>
<xml_diff>
--- a/ThesisSeminar/newOne.pptx
+++ b/ThesisSeminar/newOne.pptx
@@ -474,10 +474,10 @@
           <c:layoutTarget val="inner"/>
           <c:xMode val="edge"/>
           <c:yMode val="edge"/>
-          <c:x val="0.0889545558156373"/>
-          <c:y val="0.152416430811596"/>
-          <c:w val="0.824082884468775"/>
-          <c:h val="0.53456360437543"/>
+          <c:x val="0.0432220039292731"/>
+          <c:y val="0.0292134831460674"/>
+          <c:w val="0.952494237581795"/>
+          <c:h val="0.824330000884721"/>
         </c:manualLayout>
       </c:layout>
       <c:lineChart>
@@ -488,7 +488,7 @@
           <c:order val="0"/>
           <c:tx>
             <c:strRef>
-              <c:f>Sheet1!$B$1</c:f>
+              <c:f>Sheet84!$G$8</c:f>
               <c:strCache>
                 <c:ptCount val="1"/>
                 <c:pt idx="0">
@@ -499,17 +499,17 @@
           </c:tx>
           <c:cat>
             <c:strRef>
-              <c:f>Sheet1!$A$2:$A$19</c:f>
+              <c:f>Sheet84!$B$9:$B$26</c:f>
               <c:strCache>
                 <c:ptCount val="18"/>
                 <c:pt idx="0">
-                  <c:v>C-Associator</c:v>
+                  <c:v>CheckAssociator</c:v>
                 </c:pt>
                 <c:pt idx="1">
                   <c:v>Debug</c:v>
                 </c:pt>
                 <c:pt idx="2">
-                  <c:v>D-Scanner</c:v>
+                  <c:v>DirectoryScanner</c:v>
                 </c:pt>
                 <c:pt idx="3">
                   <c:v>Group</c:v>
@@ -518,13 +518,13 @@
                   <c:v>Image</c:v>
                 </c:pt>
                 <c:pt idx="5">
-                  <c:v>J-Wrapper</c:v>
+                  <c:v>JavaWrapper</c:v>
                 </c:pt>
                 <c:pt idx="6">
                   <c:v>List</c:v>
                 </c:pt>
                 <c:pt idx="7">
-                  <c:v>N-Sequence</c:v>
+                  <c:v>NodeSequence</c:v>
                 </c:pt>
                 <c:pt idx="8">
                   <c:v>Project</c:v>
@@ -533,7 +533,7 @@
                   <c:v>Repository</c:v>
                 </c:pt>
                 <c:pt idx="10">
-                  <c:v>Scanner</c:v>
+                  <c:v>Scene</c:v>
                 </c:pt>
                 <c:pt idx="11">
                   <c:v>Server</c:v>
@@ -548,7 +548,7 @@
                   <c:v>Stopwords</c:v>
                 </c:pt>
                 <c:pt idx="15">
-                  <c:v>S-Helper</c:v>
+                  <c:v>StringHelper</c:v>
                 </c:pt>
                 <c:pt idx="16">
                   <c:v>Xstring</c:v>
@@ -561,7 +561,7 @@
           </c:cat>
           <c:val>
             <c:numRef>
-              <c:f>Sheet1!$B$2:$B$19</c:f>
+              <c:f>Sheet84!$G$9:$G$26</c:f>
               <c:numCache>
                 <c:formatCode>0%</c:formatCode>
                 <c:ptCount val="18"/>
@@ -629,7 +629,7 @@
           <c:order val="1"/>
           <c:tx>
             <c:strRef>
-              <c:f>Sheet1!$C$1</c:f>
+              <c:f>Sheet84!$H$8</c:f>
               <c:strCache>
                 <c:ptCount val="1"/>
                 <c:pt idx="0">
@@ -640,17 +640,17 @@
           </c:tx>
           <c:cat>
             <c:strRef>
-              <c:f>Sheet1!$A$2:$A$19</c:f>
+              <c:f>Sheet84!$B$9:$B$26</c:f>
               <c:strCache>
                 <c:ptCount val="18"/>
                 <c:pt idx="0">
-                  <c:v>C-Associator</c:v>
+                  <c:v>CheckAssociator</c:v>
                 </c:pt>
                 <c:pt idx="1">
                   <c:v>Debug</c:v>
                 </c:pt>
                 <c:pt idx="2">
-                  <c:v>D-Scanner</c:v>
+                  <c:v>DirectoryScanner</c:v>
                 </c:pt>
                 <c:pt idx="3">
                   <c:v>Group</c:v>
@@ -659,13 +659,13 @@
                   <c:v>Image</c:v>
                 </c:pt>
                 <c:pt idx="5">
-                  <c:v>J-Wrapper</c:v>
+                  <c:v>JavaWrapper</c:v>
                 </c:pt>
                 <c:pt idx="6">
                   <c:v>List</c:v>
                 </c:pt>
                 <c:pt idx="7">
-                  <c:v>N-Sequence</c:v>
+                  <c:v>NodeSequence</c:v>
                 </c:pt>
                 <c:pt idx="8">
                   <c:v>Project</c:v>
@@ -674,7 +674,7 @@
                   <c:v>Repository</c:v>
                 </c:pt>
                 <c:pt idx="10">
-                  <c:v>Scanner</c:v>
+                  <c:v>Scene</c:v>
                 </c:pt>
                 <c:pt idx="11">
                   <c:v>Server</c:v>
@@ -689,7 +689,7 @@
                   <c:v>Stopwords</c:v>
                 </c:pt>
                 <c:pt idx="15">
-                  <c:v>S-Helper</c:v>
+                  <c:v>StringHelper</c:v>
                 </c:pt>
                 <c:pt idx="16">
                   <c:v>Xstring</c:v>
@@ -702,7 +702,7 @@
           </c:cat>
           <c:val>
             <c:numRef>
-              <c:f>Sheet1!$C$2:$C$19</c:f>
+              <c:f>Sheet84!$H$9:$H$26</c:f>
               <c:numCache>
                 <c:formatCode>0%</c:formatCode>
                 <c:ptCount val="18"/>
@@ -775,38 +775,21 @@
         </c:dLbls>
         <c:marker val="1"/>
         <c:smooth val="0"/>
-        <c:axId val="-2116554952"/>
-        <c:axId val="-2115786504"/>
+        <c:axId val="2131249144"/>
+        <c:axId val="2131525928"/>
       </c:lineChart>
       <c:catAx>
-        <c:axId val="-2116554952"/>
+        <c:axId val="2131249144"/>
         <c:scaling>
           <c:orientation val="minMax"/>
         </c:scaling>
         <c:delete val="0"/>
         <c:axPos val="b"/>
         <c:numFmt formatCode="General" sourceLinked="1"/>
-        <c:majorTickMark val="out"/>
+        <c:majorTickMark val="none"/>
         <c:minorTickMark val="none"/>
         <c:tickLblPos val="nextTo"/>
-        <c:txPr>
-          <a:bodyPr/>
-          <a:lstStyle/>
-          <a:p>
-            <a:pPr>
-              <a:defRPr sz="1803" b="0" i="0" cap="none" normalizeH="0" baseline="0">
-                <a:solidFill>
-                  <a:schemeClr val="tx1">
-                    <a:lumMod val="65000"/>
-                    <a:lumOff val="35000"/>
-                  </a:schemeClr>
-                </a:solidFill>
-              </a:defRPr>
-            </a:pPr>
-            <a:endParaRPr lang="en-US"/>
-          </a:p>
-        </c:txPr>
-        <c:crossAx val="-2115786504"/>
+        <c:crossAx val="2131525928"/>
         <c:crosses val="autoZero"/>
         <c:auto val="1"/>
         <c:lblAlgn val="ctr"/>
@@ -814,66 +797,495 @@
         <c:noMultiLvlLbl val="0"/>
       </c:catAx>
       <c:valAx>
-        <c:axId val="-2115786504"/>
+        <c:axId val="2131525928"/>
         <c:scaling>
           <c:orientation val="minMax"/>
         </c:scaling>
         <c:delete val="0"/>
         <c:axPos val="l"/>
         <c:majorGridlines/>
+        <c:title>
+          <c:tx>
+            <c:rich>
+              <a:bodyPr/>
+              <a:lstStyle/>
+              <a:p>
+                <a:pPr>
+                  <a:defRPr sz="1400"/>
+                </a:pPr>
+                <a:r>
+                  <a:rPr lang="en-US" sz="1400"/>
+                  <a:t>Improvement</a:t>
+                </a:r>
+                <a:r>
+                  <a:rPr lang="en-US" sz="1400" baseline="0"/>
+                  <a:t> of DSSR over R and R+</a:t>
+                </a:r>
+                <a:endParaRPr lang="en-US" sz="1400"/>
+              </a:p>
+            </c:rich>
+          </c:tx>
+          <c:overlay val="0"/>
+        </c:title>
         <c:numFmt formatCode="0%" sourceLinked="1"/>
-        <c:majorTickMark val="out"/>
+        <c:majorTickMark val="none"/>
         <c:minorTickMark val="none"/>
         <c:tickLblPos val="nextTo"/>
-        <c:crossAx val="-2116554952"/>
+        <c:crossAx val="2131249144"/>
         <c:crosses val="autoZero"/>
         <c:crossBetween val="between"/>
       </c:valAx>
-      <c:spPr>
-        <a:noFill/>
-        <a:ln w="25397">
-          <a:noFill/>
-        </a:ln>
-      </c:spPr>
+      <c:dTable>
+        <c:showHorzBorder val="1"/>
+        <c:showVertBorder val="1"/>
+        <c:showOutline val="1"/>
+        <c:showKeys val="1"/>
+      </c:dTable>
     </c:plotArea>
-    <c:legend>
-      <c:legendPos val="tr"/>
-      <c:layout>
-        <c:manualLayout>
-          <c:xMode val="edge"/>
-          <c:yMode val="edge"/>
-          <c:x val="0.822530864197531"/>
-          <c:y val="0.0"/>
-          <c:w val="0.166666666666667"/>
-          <c:h val="0.130696739222572"/>
-        </c:manualLayout>
-      </c:layout>
-      <c:overlay val="0"/>
-      <c:txPr>
-        <a:bodyPr/>
-        <a:lstStyle/>
-        <a:p>
-          <a:pPr>
-            <a:defRPr sz="1403"/>
-          </a:pPr>
-          <a:endParaRPr lang="en-US"/>
-        </a:p>
-      </c:txPr>
-    </c:legend>
     <c:plotVisOnly val="1"/>
     <c:dispBlanksAs val="gap"/>
     <c:showDLblsOverMax val="0"/>
   </c:chart>
-  <c:txPr>
-    <a:bodyPr/>
-    <a:lstStyle/>
-    <a:p>
-      <a:pPr>
-        <a:defRPr sz="1803"/>
-      </a:pPr>
-      <a:endParaRPr lang="en-US"/>
-    </a:p>
-  </c:txPr>
+  <c:spPr>
+    <a:solidFill>
+      <a:schemeClr val="bg1"/>
+    </a:solidFill>
+    <a:ln>
+      <a:solidFill>
+        <a:schemeClr val="tx1">
+          <a:tint val="75000"/>
+          <a:shade val="95000"/>
+          <a:satMod val="105000"/>
+        </a:schemeClr>
+      </a:solidFill>
+      <a:prstDash val="solid"/>
+    </a:ln>
+  </c:spPr>
+  <c:externalData r:id="rId1">
+    <c:autoUpdate val="0"/>
+  </c:externalData>
+</c:chartSpace>
+</file>
+
+<file path=ppt/charts/chart3.xml><?xml version="1.0" encoding="utf-8"?>
+<c:chartSpace xmlns:c="http://schemas.openxmlformats.org/drawingml/2006/chart" xmlns:a="http://schemas.openxmlformats.org/drawingml/2006/main" xmlns:r="http://schemas.openxmlformats.org/officeDocument/2006/relationships">
+  <c:date1904 val="0"/>
+  <c:lang val="en-US"/>
+  <c:roundedCorners val="0"/>
+  <mc:AlternateContent xmlns:mc="http://schemas.openxmlformats.org/markup-compatibility/2006">
+    <mc:Choice xmlns:c14="http://schemas.microsoft.com/office/drawing/2007/8/2/chart" Requires="c14">
+      <c14:style val="118"/>
+    </mc:Choice>
+    <mc:Fallback>
+      <c:style val="18"/>
+    </mc:Fallback>
+  </mc:AlternateContent>
+  <c:chart>
+    <c:autoTitleDeleted val="0"/>
+    <c:plotArea>
+      <c:layout>
+        <c:manualLayout>
+          <c:layoutTarget val="inner"/>
+          <c:xMode val="edge"/>
+          <c:yMode val="edge"/>
+          <c:x val="0.0432220039292731"/>
+          <c:y val="0.0292134831460674"/>
+          <c:w val="0.952494237581795"/>
+          <c:h val="0.824330000884721"/>
+        </c:manualLayout>
+      </c:layout>
+      <c:lineChart>
+        <c:grouping val="standard"/>
+        <c:varyColors val="0"/>
+        <c:ser>
+          <c:idx val="0"/>
+          <c:order val="0"/>
+          <c:tx>
+            <c:strRef>
+              <c:f>Sheet84!$G$8</c:f>
+              <c:strCache>
+                <c:ptCount val="1"/>
+                <c:pt idx="0">
+                  <c:v>DSSR over R</c:v>
+                </c:pt>
+              </c:strCache>
+            </c:strRef>
+          </c:tx>
+          <c:cat>
+            <c:strRef>
+              <c:f>Sheet84!$B$9:$B$26</c:f>
+              <c:strCache>
+                <c:ptCount val="18"/>
+                <c:pt idx="0">
+                  <c:v>CheckAssociator</c:v>
+                </c:pt>
+                <c:pt idx="1">
+                  <c:v>Debug</c:v>
+                </c:pt>
+                <c:pt idx="2">
+                  <c:v>DirectoryScanner</c:v>
+                </c:pt>
+                <c:pt idx="3">
+                  <c:v>Group</c:v>
+                </c:pt>
+                <c:pt idx="4">
+                  <c:v>Image</c:v>
+                </c:pt>
+                <c:pt idx="5">
+                  <c:v>JavaWrapper</c:v>
+                </c:pt>
+                <c:pt idx="6">
+                  <c:v>List</c:v>
+                </c:pt>
+                <c:pt idx="7">
+                  <c:v>NodeSequence</c:v>
+                </c:pt>
+                <c:pt idx="8">
+                  <c:v>Project</c:v>
+                </c:pt>
+                <c:pt idx="9">
+                  <c:v>Repository</c:v>
+                </c:pt>
+                <c:pt idx="10">
+                  <c:v>Scene</c:v>
+                </c:pt>
+                <c:pt idx="11">
+                  <c:v>Server</c:v>
+                </c:pt>
+                <c:pt idx="12">
+                  <c:v>Sorter</c:v>
+                </c:pt>
+                <c:pt idx="13">
+                  <c:v>Statistics</c:v>
+                </c:pt>
+                <c:pt idx="14">
+                  <c:v>Stopwords</c:v>
+                </c:pt>
+                <c:pt idx="15">
+                  <c:v>StringHelper</c:v>
+                </c:pt>
+                <c:pt idx="16">
+                  <c:v>Xstring</c:v>
+                </c:pt>
+                <c:pt idx="17">
+                  <c:v>total</c:v>
+                </c:pt>
+              </c:strCache>
+            </c:strRef>
+          </c:cat>
+          <c:val>
+            <c:numRef>
+              <c:f>Sheet84!$G$9:$G$26</c:f>
+              <c:numCache>
+                <c:formatCode>0%</c:formatCode>
+                <c:ptCount val="18"/>
+                <c:pt idx="0">
+                  <c:v>0.0</c:v>
+                </c:pt>
+                <c:pt idx="1">
+                  <c:v>0.2</c:v>
+                </c:pt>
+                <c:pt idx="2">
+                  <c:v>0.0833333333333333</c:v>
+                </c:pt>
+                <c:pt idx="3">
+                  <c:v>0.0</c:v>
+                </c:pt>
+                <c:pt idx="4">
+                  <c:v>0.0</c:v>
+                </c:pt>
+                <c:pt idx="5">
+                  <c:v>0.25</c:v>
+                </c:pt>
+                <c:pt idx="6">
+                  <c:v>0.166666666666667</c:v>
+                </c:pt>
+                <c:pt idx="7">
+                  <c:v>0.0</c:v>
+                </c:pt>
+                <c:pt idx="8">
+                  <c:v>0.0579710144927536</c:v>
+                </c:pt>
+                <c:pt idx="9">
+                  <c:v>0.225</c:v>
+                </c:pt>
+                <c:pt idx="10">
+                  <c:v>0.037037037037037</c:v>
+                </c:pt>
+                <c:pt idx="11">
+                  <c:v>0.117647058823529</c:v>
+                </c:pt>
+                <c:pt idx="12">
+                  <c:v>0.333333333333333</c:v>
+                </c:pt>
+                <c:pt idx="13">
+                  <c:v>0.333333333333333</c:v>
+                </c:pt>
+                <c:pt idx="14">
+                  <c:v>0.125</c:v>
+                </c:pt>
+                <c:pt idx="15">
+                  <c:v>0.0227272727272727</c:v>
+                </c:pt>
+                <c:pt idx="16">
+                  <c:v>0.0</c:v>
+                </c:pt>
+                <c:pt idx="17">
+                  <c:v>0.0875331564986737</c:v>
+                </c:pt>
+              </c:numCache>
+            </c:numRef>
+          </c:val>
+          <c:smooth val="0"/>
+        </c:ser>
+        <c:ser>
+          <c:idx val="1"/>
+          <c:order val="1"/>
+          <c:tx>
+            <c:strRef>
+              <c:f>Sheet84!$H$8</c:f>
+              <c:strCache>
+                <c:ptCount val="1"/>
+                <c:pt idx="0">
+                  <c:v>DSSR over R+</c:v>
+                </c:pt>
+              </c:strCache>
+            </c:strRef>
+          </c:tx>
+          <c:cat>
+            <c:strRef>
+              <c:f>Sheet84!$B$9:$B$26</c:f>
+              <c:strCache>
+                <c:ptCount val="18"/>
+                <c:pt idx="0">
+                  <c:v>CheckAssociator</c:v>
+                </c:pt>
+                <c:pt idx="1">
+                  <c:v>Debug</c:v>
+                </c:pt>
+                <c:pt idx="2">
+                  <c:v>DirectoryScanner</c:v>
+                </c:pt>
+                <c:pt idx="3">
+                  <c:v>Group</c:v>
+                </c:pt>
+                <c:pt idx="4">
+                  <c:v>Image</c:v>
+                </c:pt>
+                <c:pt idx="5">
+                  <c:v>JavaWrapper</c:v>
+                </c:pt>
+                <c:pt idx="6">
+                  <c:v>List</c:v>
+                </c:pt>
+                <c:pt idx="7">
+                  <c:v>NodeSequence</c:v>
+                </c:pt>
+                <c:pt idx="8">
+                  <c:v>Project</c:v>
+                </c:pt>
+                <c:pt idx="9">
+                  <c:v>Repository</c:v>
+                </c:pt>
+                <c:pt idx="10">
+                  <c:v>Scene</c:v>
+                </c:pt>
+                <c:pt idx="11">
+                  <c:v>Server</c:v>
+                </c:pt>
+                <c:pt idx="12">
+                  <c:v>Sorter</c:v>
+                </c:pt>
+                <c:pt idx="13">
+                  <c:v>Statistics</c:v>
+                </c:pt>
+                <c:pt idx="14">
+                  <c:v>Stopwords</c:v>
+                </c:pt>
+                <c:pt idx="15">
+                  <c:v>StringHelper</c:v>
+                </c:pt>
+                <c:pt idx="16">
+                  <c:v>Xstring</c:v>
+                </c:pt>
+                <c:pt idx="17">
+                  <c:v>total</c:v>
+                </c:pt>
+              </c:strCache>
+            </c:strRef>
+          </c:cat>
+          <c:val>
+            <c:numRef>
+              <c:f>Sheet84!$H$9:$H$26</c:f>
+              <c:numCache>
+                <c:formatCode>0%</c:formatCode>
+                <c:ptCount val="18"/>
+                <c:pt idx="0">
+                  <c:v>0.166666666666667</c:v>
+                </c:pt>
+                <c:pt idx="1">
+                  <c:v>0.0</c:v>
+                </c:pt>
+                <c:pt idx="2">
+                  <c:v>0.0285714285714286</c:v>
+                </c:pt>
+                <c:pt idx="3">
+                  <c:v>0.1</c:v>
+                </c:pt>
+                <c:pt idx="4">
+                  <c:v>0.166666666666667</c:v>
+                </c:pt>
+                <c:pt idx="5">
+                  <c:v>0.0</c:v>
+                </c:pt>
+                <c:pt idx="6">
+                  <c:v>0.0</c:v>
+                </c:pt>
+                <c:pt idx="7">
+                  <c:v>0.0555555555555555</c:v>
+                </c:pt>
+                <c:pt idx="8">
+                  <c:v>0.0454545454545454</c:v>
+                </c:pt>
+                <c:pt idx="9">
+                  <c:v>0.0</c:v>
+                </c:pt>
+                <c:pt idx="10">
+                  <c:v>0.0384615384615385</c:v>
+                </c:pt>
+                <c:pt idx="11">
+                  <c:v>0.0</c:v>
+                </c:pt>
+                <c:pt idx="12">
+                  <c:v>0.0</c:v>
+                </c:pt>
+                <c:pt idx="13">
+                  <c:v>0.0434782608695652</c:v>
+                </c:pt>
+                <c:pt idx="14">
+                  <c:v>0.142857142857143</c:v>
+                </c:pt>
+                <c:pt idx="15">
+                  <c:v>0.0</c:v>
+                </c:pt>
+                <c:pt idx="16">
+                  <c:v>0.0434782608695652</c:v>
+                </c:pt>
+                <c:pt idx="17">
+                  <c:v>0.0385674931129477</c:v>
+                </c:pt>
+              </c:numCache>
+            </c:numRef>
+          </c:val>
+          <c:smooth val="0"/>
+        </c:ser>
+        <c:dLbls>
+          <c:showLegendKey val="0"/>
+          <c:showVal val="0"/>
+          <c:showCatName val="0"/>
+          <c:showSerName val="0"/>
+          <c:showPercent val="0"/>
+          <c:showBubbleSize val="0"/>
+        </c:dLbls>
+        <c:marker val="1"/>
+        <c:smooth val="0"/>
+        <c:axId val="2132514504"/>
+        <c:axId val="2132506872"/>
+      </c:lineChart>
+      <c:catAx>
+        <c:axId val="2132514504"/>
+        <c:scaling>
+          <c:orientation val="minMax"/>
+        </c:scaling>
+        <c:delete val="0"/>
+        <c:axPos val="b"/>
+        <c:numFmt formatCode="General" sourceLinked="1"/>
+        <c:majorTickMark val="none"/>
+        <c:minorTickMark val="none"/>
+        <c:tickLblPos val="nextTo"/>
+        <c:crossAx val="2132506872"/>
+        <c:crosses val="autoZero"/>
+        <c:auto val="1"/>
+        <c:lblAlgn val="ctr"/>
+        <c:lblOffset val="100"/>
+        <c:noMultiLvlLbl val="0"/>
+      </c:catAx>
+      <c:valAx>
+        <c:axId val="2132506872"/>
+        <c:scaling>
+          <c:orientation val="minMax"/>
+        </c:scaling>
+        <c:delete val="0"/>
+        <c:axPos val="l"/>
+        <c:majorGridlines/>
+        <c:title>
+          <c:tx>
+            <c:rich>
+              <a:bodyPr/>
+              <a:lstStyle/>
+              <a:p>
+                <a:pPr>
+                  <a:defRPr sz="1400"/>
+                </a:pPr>
+                <a:r>
+                  <a:rPr lang="en-US" sz="1400"/>
+                  <a:t>Improvement</a:t>
+                </a:r>
+                <a:r>
+                  <a:rPr lang="en-US" sz="1400" baseline="0"/>
+                  <a:t> of DSSR over R and R+</a:t>
+                </a:r>
+                <a:endParaRPr lang="en-US" sz="1400"/>
+              </a:p>
+            </c:rich>
+          </c:tx>
+          <c:layout/>
+          <c:overlay val="0"/>
+        </c:title>
+        <c:numFmt formatCode="0%" sourceLinked="1"/>
+        <c:majorTickMark val="none"/>
+        <c:minorTickMark val="none"/>
+        <c:tickLblPos val="nextTo"/>
+        <c:crossAx val="2132514504"/>
+        <c:crosses val="autoZero"/>
+        <c:crossBetween val="between"/>
+      </c:valAx>
+      <c:dTable>
+        <c:showHorzBorder val="1"/>
+        <c:showVertBorder val="1"/>
+        <c:showOutline val="1"/>
+        <c:showKeys val="1"/>
+        <c:txPr>
+          <a:bodyPr/>
+          <a:lstStyle/>
+          <a:p>
+            <a:pPr rtl="0">
+              <a:defRPr sz="900"/>
+            </a:pPr>
+            <a:endParaRPr lang="en-US"/>
+          </a:p>
+        </c:txPr>
+      </c:dTable>
+    </c:plotArea>
+    <c:plotVisOnly val="1"/>
+    <c:dispBlanksAs val="gap"/>
+    <c:showDLblsOverMax val="0"/>
+  </c:chart>
+  <c:spPr>
+    <a:solidFill>
+      <a:schemeClr val="bg1"/>
+    </a:solidFill>
+    <a:ln>
+      <a:solidFill>
+        <a:schemeClr val="tx1">
+          <a:tint val="75000"/>
+          <a:shade val="95000"/>
+          <a:satMod val="105000"/>
+        </a:schemeClr>
+      </a:solidFill>
+      <a:prstDash val="solid"/>
+    </a:ln>
+  </c:spPr>
   <c:externalData r:id="rId1">
     <c:autoUpdate val="0"/>
   </c:externalData>
@@ -1061,7 +1473,7 @@
           <a:p>
             <a:fld id="{2D2B0758-6489-CF4D-BEB3-FD09930D1791}" type="datetimeFigureOut">
               <a:rPr lang="en-US" smtClean="0"/>
-              <a:t>19/01/2013</a:t>
+              <a:t>21/01/2013</a:t>
             </a:fld>
             <a:endParaRPr lang="en-US"/>
           </a:p>
@@ -1231,7 +1643,7 @@
           <a:p>
             <a:fld id="{2D2B0758-6489-CF4D-BEB3-FD09930D1791}" type="datetimeFigureOut">
               <a:rPr lang="en-US" smtClean="0"/>
-              <a:t>19/01/2013</a:t>
+              <a:t>21/01/2013</a:t>
             </a:fld>
             <a:endParaRPr lang="en-US"/>
           </a:p>
@@ -1411,7 +1823,7 @@
           <a:p>
             <a:fld id="{2D2B0758-6489-CF4D-BEB3-FD09930D1791}" type="datetimeFigureOut">
               <a:rPr lang="en-US" smtClean="0"/>
-              <a:t>19/01/2013</a:t>
+              <a:t>21/01/2013</a:t>
             </a:fld>
             <a:endParaRPr lang="en-US"/>
           </a:p>
@@ -1581,7 +1993,7 @@
           <a:p>
             <a:fld id="{2D2B0758-6489-CF4D-BEB3-FD09930D1791}" type="datetimeFigureOut">
               <a:rPr lang="en-US" smtClean="0"/>
-              <a:t>19/01/2013</a:t>
+              <a:t>21/01/2013</a:t>
             </a:fld>
             <a:endParaRPr lang="en-US"/>
           </a:p>
@@ -1827,7 +2239,7 @@
           <a:p>
             <a:fld id="{2D2B0758-6489-CF4D-BEB3-FD09930D1791}" type="datetimeFigureOut">
               <a:rPr lang="en-US" smtClean="0"/>
-              <a:t>19/01/2013</a:t>
+              <a:t>21/01/2013</a:t>
             </a:fld>
             <a:endParaRPr lang="en-US"/>
           </a:p>
@@ -2115,7 +2527,7 @@
           <a:p>
             <a:fld id="{2D2B0758-6489-CF4D-BEB3-FD09930D1791}" type="datetimeFigureOut">
               <a:rPr lang="en-US" smtClean="0"/>
-              <a:t>19/01/2013</a:t>
+              <a:t>21/01/2013</a:t>
             </a:fld>
             <a:endParaRPr lang="en-US"/>
           </a:p>
@@ -2537,7 +2949,7 @@
           <a:p>
             <a:fld id="{2D2B0758-6489-CF4D-BEB3-FD09930D1791}" type="datetimeFigureOut">
               <a:rPr lang="en-US" smtClean="0"/>
-              <a:t>19/01/2013</a:t>
+              <a:t>21/01/2013</a:t>
             </a:fld>
             <a:endParaRPr lang="en-US"/>
           </a:p>
@@ -2655,7 +3067,7 @@
           <a:p>
             <a:fld id="{2D2B0758-6489-CF4D-BEB3-FD09930D1791}" type="datetimeFigureOut">
               <a:rPr lang="en-US" smtClean="0"/>
-              <a:t>19/01/2013</a:t>
+              <a:t>21/01/2013</a:t>
             </a:fld>
             <a:endParaRPr lang="en-US"/>
           </a:p>
@@ -2750,7 +3162,7 @@
           <a:p>
             <a:fld id="{2D2B0758-6489-CF4D-BEB3-FD09930D1791}" type="datetimeFigureOut">
               <a:rPr lang="en-US" smtClean="0"/>
-              <a:t>19/01/2013</a:t>
+              <a:t>21/01/2013</a:t>
             </a:fld>
             <a:endParaRPr lang="en-US"/>
           </a:p>
@@ -3027,7 +3439,7 @@
           <a:p>
             <a:fld id="{2D2B0758-6489-CF4D-BEB3-FD09930D1791}" type="datetimeFigureOut">
               <a:rPr lang="en-US" smtClean="0"/>
-              <a:t>19/01/2013</a:t>
+              <a:t>21/01/2013</a:t>
             </a:fld>
             <a:endParaRPr lang="en-US"/>
           </a:p>
@@ -3280,7 +3692,7 @@
           <a:p>
             <a:fld id="{2D2B0758-6489-CF4D-BEB3-FD09930D1791}" type="datetimeFigureOut">
               <a:rPr lang="en-US" smtClean="0"/>
-              <a:t>19/01/2013</a:t>
+              <a:t>21/01/2013</a:t>
             </a:fld>
             <a:endParaRPr lang="en-US"/>
           </a:p>
@@ -3493,7 +3905,7 @@
           <a:p>
             <a:fld id="{2D2B0758-6489-CF4D-BEB3-FD09930D1791}" type="datetimeFigureOut">
               <a:rPr lang="en-US" smtClean="0"/>
-              <a:t>19/01/2013</a:t>
+              <a:t>21/01/2013</a:t>
             </a:fld>
             <a:endParaRPr lang="en-US"/>
           </a:p>
@@ -4949,31 +5361,6 @@
           </a:p>
         </p:txBody>
       </p:sp>
-      <p:graphicFrame>
-        <p:nvGraphicFramePr>
-          <p:cNvPr id="4" name="Content Placeholder 3"/>
-          <p:cNvGraphicFramePr>
-            <a:graphicFrameLocks noGrp="1"/>
-          </p:cNvGraphicFramePr>
-          <p:nvPr>
-            <p:ph idx="1"/>
-            <p:extLst>
-              <p:ext uri="{D42A27DB-BD31-4B8C-83A1-F6EECF244321}">
-                <p14:modId xmlns:p14="http://schemas.microsoft.com/office/powerpoint/2010/main" val="1874990273"/>
-              </p:ext>
-            </p:extLst>
-          </p:nvPr>
-        </p:nvGraphicFramePr>
-        <p:xfrm>
-          <a:off x="572660" y="2009371"/>
-          <a:ext cx="8229600" cy="4848629"/>
-        </p:xfrm>
-        <a:graphic>
-          <a:graphicData uri="http://schemas.openxmlformats.org/drawingml/2006/chart">
-            <c:chart xmlns:c="http://schemas.openxmlformats.org/drawingml/2006/chart" xmlns:r="http://schemas.openxmlformats.org/officeDocument/2006/relationships" r:id="rId2"/>
-          </a:graphicData>
-        </a:graphic>
-      </p:graphicFrame>
       <p:sp>
         <p:nvSpPr>
           <p:cNvPr id="5" name="Rectangle 4"/>
@@ -5013,6 +5400,48 @@
           </a:p>
         </p:txBody>
       </p:sp>
+      <p:graphicFrame>
+        <p:nvGraphicFramePr>
+          <p:cNvPr id="10" name="Chart 9"/>
+          <p:cNvGraphicFramePr>
+            <a:graphicFrameLocks/>
+          </p:cNvGraphicFramePr>
+          <p:nvPr/>
+        </p:nvGraphicFramePr>
+        <p:xfrm>
+          <a:off x="7864756" y="5043141"/>
+          <a:ext cx="0" cy="0"/>
+        </p:xfrm>
+        <a:graphic>
+          <a:graphicData uri="http://schemas.openxmlformats.org/drawingml/2006/chart">
+            <c:chart xmlns:c="http://schemas.openxmlformats.org/drawingml/2006/chart" xmlns:r="http://schemas.openxmlformats.org/officeDocument/2006/relationships" r:id="rId2"/>
+          </a:graphicData>
+        </a:graphic>
+      </p:graphicFrame>
+      <p:graphicFrame>
+        <p:nvGraphicFramePr>
+          <p:cNvPr id="12" name="Chart 11"/>
+          <p:cNvGraphicFramePr>
+            <a:graphicFrameLocks/>
+          </p:cNvGraphicFramePr>
+          <p:nvPr>
+            <p:extLst>
+              <p:ext uri="{D42A27DB-BD31-4B8C-83A1-F6EECF244321}">
+                <p14:modId xmlns:p14="http://schemas.microsoft.com/office/powerpoint/2010/main" val="3912608652"/>
+              </p:ext>
+            </p:extLst>
+          </p:nvPr>
+        </p:nvGraphicFramePr>
+        <p:xfrm>
+          <a:off x="457200" y="2153919"/>
+          <a:ext cx="8384544" cy="4508500"/>
+        </p:xfrm>
+        <a:graphic>
+          <a:graphicData uri="http://schemas.openxmlformats.org/drawingml/2006/chart">
+            <c:chart xmlns:c="http://schemas.openxmlformats.org/drawingml/2006/chart" xmlns:r="http://schemas.openxmlformats.org/officeDocument/2006/relationships" r:id="rId3"/>
+          </a:graphicData>
+        </a:graphic>
+      </p:graphicFrame>
     </p:spTree>
     <p:extLst>
       <p:ext uri="{BB962C8B-B14F-4D97-AF65-F5344CB8AC3E}">
@@ -5026,186 +5455,9 @@
   <p:timing>
     <p:tnLst>
       <p:par>
-        <p:cTn xmlns:p14="http://schemas.microsoft.com/office/powerpoint/2010/main" id="1" dur="indefinite" restart="never" nodeType="tmRoot">
-          <p:childTnLst>
-            <p:seq concurrent="1" nextAc="seek">
-              <p:cTn id="2" dur="indefinite" nodeType="mainSeq">
-                <p:childTnLst>
-                  <p:par>
-                    <p:cTn id="3" fill="hold">
-                      <p:stCondLst>
-                        <p:cond delay="indefinite"/>
-                      </p:stCondLst>
-                      <p:childTnLst>
-                        <p:par>
-                          <p:cTn id="4" fill="hold">
-                            <p:stCondLst>
-                              <p:cond delay="0"/>
-                            </p:stCondLst>
-                            <p:childTnLst>
-                              <p:par>
-                                <p:cTn id="5" presetID="1" presetClass="entr" presetSubtype="0" fill="hold" grpId="0" nodeType="clickEffect">
-                                  <p:stCondLst>
-                                    <p:cond delay="0"/>
-                                  </p:stCondLst>
-                                  <p:childTnLst>
-                                    <p:set>
-                                      <p:cBhvr>
-                                        <p:cTn id="6" dur="1" fill="hold">
-                                          <p:stCondLst>
-                                            <p:cond delay="0"/>
-                                          </p:stCondLst>
-                                        </p:cTn>
-                                        <p:tgtEl>
-                                          <p:spTgt spid="4">
-                                            <p:graphicEl>
-                                              <a:chart seriesIdx="-3" categoryIdx="-3" bldStep="gridLegend"/>
-                                            </p:graphicEl>
-                                          </p:spTgt>
-                                        </p:tgtEl>
-                                        <p:attrNameLst>
-                                          <p:attrName>style.visibility</p:attrName>
-                                        </p:attrNameLst>
-                                      </p:cBhvr>
-                                      <p:to>
-                                        <p:strVal val="visible"/>
-                                      </p:to>
-                                    </p:set>
-                                  </p:childTnLst>
-                                </p:cTn>
-                              </p:par>
-                            </p:childTnLst>
-                          </p:cTn>
-                        </p:par>
-                      </p:childTnLst>
-                    </p:cTn>
-                  </p:par>
-                  <p:par>
-                    <p:cTn id="7" fill="hold">
-                      <p:stCondLst>
-                        <p:cond delay="indefinite"/>
-                      </p:stCondLst>
-                      <p:childTnLst>
-                        <p:par>
-                          <p:cTn id="8" fill="hold">
-                            <p:stCondLst>
-                              <p:cond delay="0"/>
-                            </p:stCondLst>
-                            <p:childTnLst>
-                              <p:par>
-                                <p:cTn id="9" presetID="1" presetClass="entr" presetSubtype="0" fill="hold" grpId="0" nodeType="clickEffect">
-                                  <p:stCondLst>
-                                    <p:cond delay="0"/>
-                                  </p:stCondLst>
-                                  <p:childTnLst>
-                                    <p:set>
-                                      <p:cBhvr>
-                                        <p:cTn id="10" dur="1" fill="hold">
-                                          <p:stCondLst>
-                                            <p:cond delay="0"/>
-                                          </p:stCondLst>
-                                        </p:cTn>
-                                        <p:tgtEl>
-                                          <p:spTgt spid="4">
-                                            <p:graphicEl>
-                                              <a:chart seriesIdx="0" categoryIdx="-4" bldStep="series"/>
-                                            </p:graphicEl>
-                                          </p:spTgt>
-                                        </p:tgtEl>
-                                        <p:attrNameLst>
-                                          <p:attrName>style.visibility</p:attrName>
-                                        </p:attrNameLst>
-                                      </p:cBhvr>
-                                      <p:to>
-                                        <p:strVal val="visible"/>
-                                      </p:to>
-                                    </p:set>
-                                  </p:childTnLst>
-                                </p:cTn>
-                              </p:par>
-                            </p:childTnLst>
-                          </p:cTn>
-                        </p:par>
-                      </p:childTnLst>
-                    </p:cTn>
-                  </p:par>
-                  <p:par>
-                    <p:cTn id="11" fill="hold">
-                      <p:stCondLst>
-                        <p:cond delay="indefinite"/>
-                      </p:stCondLst>
-                      <p:childTnLst>
-                        <p:par>
-                          <p:cTn id="12" fill="hold">
-                            <p:stCondLst>
-                              <p:cond delay="0"/>
-                            </p:stCondLst>
-                            <p:childTnLst>
-                              <p:par>
-                                <p:cTn id="13" presetID="1" presetClass="entr" presetSubtype="0" fill="hold" grpId="0" nodeType="clickEffect">
-                                  <p:stCondLst>
-                                    <p:cond delay="0"/>
-                                  </p:stCondLst>
-                                  <p:childTnLst>
-                                    <p:set>
-                                      <p:cBhvr>
-                                        <p:cTn id="14" dur="1" fill="hold">
-                                          <p:stCondLst>
-                                            <p:cond delay="0"/>
-                                          </p:stCondLst>
-                                        </p:cTn>
-                                        <p:tgtEl>
-                                          <p:spTgt spid="4">
-                                            <p:graphicEl>
-                                              <a:chart seriesIdx="1" categoryIdx="-4" bldStep="series"/>
-                                            </p:graphicEl>
-                                          </p:spTgt>
-                                        </p:tgtEl>
-                                        <p:attrNameLst>
-                                          <p:attrName>style.visibility</p:attrName>
-                                        </p:attrNameLst>
-                                      </p:cBhvr>
-                                      <p:to>
-                                        <p:strVal val="visible"/>
-                                      </p:to>
-                                    </p:set>
-                                  </p:childTnLst>
-                                </p:cTn>
-                              </p:par>
-                            </p:childTnLst>
-                          </p:cTn>
-                        </p:par>
-                      </p:childTnLst>
-                    </p:cTn>
-                  </p:par>
-                </p:childTnLst>
-              </p:cTn>
-              <p:prevCondLst>
-                <p:cond evt="onPrev" delay="0">
-                  <p:tgtEl>
-                    <p:sldTgt/>
-                  </p:tgtEl>
-                </p:cond>
-              </p:prevCondLst>
-              <p:nextCondLst>
-                <p:cond evt="onNext" delay="0">
-                  <p:tgtEl>
-                    <p:sldTgt/>
-                  </p:tgtEl>
-                </p:cond>
-              </p:nextCondLst>
-            </p:seq>
-          </p:childTnLst>
-        </p:cTn>
+        <p:cTn xmlns:p14="http://schemas.microsoft.com/office/powerpoint/2010/main" id="1" dur="indefinite" restart="never" nodeType="tmRoot"/>
       </p:par>
     </p:tnLst>
-    <p:bldLst>
-      <p:bldGraphic spid="4" grpId="0">
-        <p:bldSub>
-          <a:bldChart bld="series"/>
-        </p:bldSub>
-      </p:bldGraphic>
-    </p:bldLst>
   </p:timing>
 </p:sld>
 </file>
@@ -5313,6 +5565,13 @@
   <p:clrMapOvr>
     <a:masterClrMapping/>
   </p:clrMapOvr>
+  <p:timing>
+    <p:tnLst>
+      <p:par>
+        <p:cTn xmlns:p14="http://schemas.microsoft.com/office/powerpoint/2010/main" id="1" dur="indefinite" restart="never" nodeType="tmRoot"/>
+      </p:par>
+    </p:tnLst>
+  </p:timing>
 </p:sld>
 </file>
 
@@ -5433,6 +5692,13 @@
   <p:clrMapOvr>
     <a:masterClrMapping/>
   </p:clrMapOvr>
+  <p:timing>
+    <p:tnLst>
+      <p:par>
+        <p:cTn xmlns:p14="http://schemas.microsoft.com/office/powerpoint/2010/main" id="1" dur="indefinite" restart="never" nodeType="tmRoot"/>
+      </p:par>
+    </p:tnLst>
+  </p:timing>
 </p:sld>
 </file>
 
@@ -5546,6 +5812,13 @@
   <p:clrMapOvr>
     <a:masterClrMapping/>
   </p:clrMapOvr>
+  <p:timing>
+    <p:tnLst>
+      <p:par>
+        <p:cTn xmlns:p14="http://schemas.microsoft.com/office/powerpoint/2010/main" id="1" dur="indefinite" restart="never" nodeType="tmRoot"/>
+      </p:par>
+    </p:tnLst>
+  </p:timing>
 </p:sld>
 </file>
 
@@ -5748,6 +6021,13 @@
   <p:clrMapOvr>
     <a:masterClrMapping/>
   </p:clrMapOvr>
+  <p:timing>
+    <p:tnLst>
+      <p:par>
+        <p:cTn xmlns:p14="http://schemas.microsoft.com/office/powerpoint/2010/main" id="1" dur="indefinite" restart="never" nodeType="tmRoot"/>
+      </p:par>
+    </p:tnLst>
+  </p:timing>
 </p:sld>
 </file>
 
@@ -5822,6 +6102,13 @@
   <p:clrMapOvr>
     <a:masterClrMapping/>
   </p:clrMapOvr>
+  <p:timing>
+    <p:tnLst>
+      <p:par>
+        <p:cTn xmlns:p14="http://schemas.microsoft.com/office/powerpoint/2010/main" id="1" dur="indefinite" restart="never" nodeType="tmRoot"/>
+      </p:par>
+    </p:tnLst>
+  </p:timing>
 </p:sld>
 </file>
 
@@ -5964,13 +6251,6 @@
                 <a:cs typeface="Times New Roman"/>
               </a:rPr>
               <a:t>suite</a:t>
-            </a:r>
-            <a:r>
-              <a:rPr lang="en-US" sz="2400" dirty="0" smtClean="0">
-                <a:latin typeface="Times New Roman"/>
-                <a:cs typeface="Times New Roman"/>
-              </a:rPr>
-              <a:t/>
             </a:r>
             <a:br>
               <a:rPr lang="en-US" sz="2400" dirty="0" smtClean="0">
@@ -6130,6 +6410,13 @@
   <p:clrMapOvr>
     <a:masterClrMapping/>
   </p:clrMapOvr>
+  <p:timing>
+    <p:tnLst>
+      <p:par>
+        <p:cTn xmlns:p14="http://schemas.microsoft.com/office/powerpoint/2010/main" id="1" dur="indefinite" restart="never" nodeType="tmRoot"/>
+      </p:par>
+    </p:tnLst>
+  </p:timing>
 </p:sld>
 </file>
 

</xml_diff>

<commit_message>
One minor mistake removed in generation of .jar file.
</commit_message>
<xml_diff>
--- a/ThesisSeminar/newOne.pptx
+++ b/ThesisSeminar/newOne.pptx
@@ -775,11 +775,11 @@
         </c:dLbls>
         <c:marker val="1"/>
         <c:smooth val="0"/>
-        <c:axId val="2131249144"/>
-        <c:axId val="2131525928"/>
+        <c:axId val="2146239048"/>
+        <c:axId val="2146314984"/>
       </c:lineChart>
       <c:catAx>
-        <c:axId val="2131249144"/>
+        <c:axId val="2146239048"/>
         <c:scaling>
           <c:orientation val="minMax"/>
         </c:scaling>
@@ -789,7 +789,7 @@
         <c:majorTickMark val="none"/>
         <c:minorTickMark val="none"/>
         <c:tickLblPos val="nextTo"/>
-        <c:crossAx val="2131525928"/>
+        <c:crossAx val="2146314984"/>
         <c:crosses val="autoZero"/>
         <c:auto val="1"/>
         <c:lblAlgn val="ctr"/>
@@ -797,7 +797,7 @@
         <c:noMultiLvlLbl val="0"/>
       </c:catAx>
       <c:valAx>
-        <c:axId val="2131525928"/>
+        <c:axId val="2146314984"/>
         <c:scaling>
           <c:orientation val="minMax"/>
         </c:scaling>
@@ -831,7 +831,7 @@
         <c:majorTickMark val="none"/>
         <c:minorTickMark val="none"/>
         <c:tickLblPos val="nextTo"/>
-        <c:crossAx val="2131249144"/>
+        <c:crossAx val="2146239048"/>
         <c:crosses val="autoZero"/>
         <c:crossBetween val="between"/>
       </c:valAx>
@@ -1189,11 +1189,11 @@
         </c:dLbls>
         <c:marker val="1"/>
         <c:smooth val="0"/>
-        <c:axId val="2132514504"/>
-        <c:axId val="2132506872"/>
+        <c:axId val="2146379080"/>
+        <c:axId val="2146382136"/>
       </c:lineChart>
       <c:catAx>
-        <c:axId val="2132514504"/>
+        <c:axId val="2146379080"/>
         <c:scaling>
           <c:orientation val="minMax"/>
         </c:scaling>
@@ -1203,7 +1203,7 @@
         <c:majorTickMark val="none"/>
         <c:minorTickMark val="none"/>
         <c:tickLblPos val="nextTo"/>
-        <c:crossAx val="2132506872"/>
+        <c:crossAx val="2146382136"/>
         <c:crosses val="autoZero"/>
         <c:auto val="1"/>
         <c:lblAlgn val="ctr"/>
@@ -1211,7 +1211,7 @@
         <c:noMultiLvlLbl val="0"/>
       </c:catAx>
       <c:valAx>
-        <c:axId val="2132506872"/>
+        <c:axId val="2146382136"/>
         <c:scaling>
           <c:orientation val="minMax"/>
         </c:scaling>
@@ -1246,7 +1246,7 @@
         <c:majorTickMark val="none"/>
         <c:minorTickMark val="none"/>
         <c:tickLblPos val="nextTo"/>
-        <c:crossAx val="2132514504"/>
+        <c:crossAx val="2146379080"/>
         <c:crosses val="autoZero"/>
         <c:crossBetween val="between"/>
       </c:valAx>
@@ -4292,7 +4292,9 @@
         </p:nvSpPr>
         <p:spPr/>
         <p:txBody>
-          <a:bodyPr/>
+          <a:bodyPr>
+            <a:normAutofit/>
+          </a:bodyPr>
           <a:lstStyle/>
           <a:p>
             <a:r>
@@ -4300,7 +4302,28 @@
                 <a:latin typeface="Times New Roman"/>
                 <a:cs typeface="Times New Roman"/>
               </a:rPr>
-              <a:t>New Strategies for Finding failures and its domains</a:t>
+              <a:t>New Strategies for Finding </a:t>
+            </a:r>
+            <a:r>
+              <a:rPr lang="en-US" dirty="0" smtClean="0">
+                <a:latin typeface="Times New Roman"/>
+                <a:cs typeface="Times New Roman"/>
+              </a:rPr>
+              <a:t>Failures </a:t>
+            </a:r>
+            <a:r>
+              <a:rPr lang="en-US" dirty="0" smtClean="0">
+                <a:latin typeface="Times New Roman"/>
+                <a:cs typeface="Times New Roman"/>
+              </a:rPr>
+              <a:t>and its </a:t>
+            </a:r>
+            <a:r>
+              <a:rPr lang="en-US" dirty="0" smtClean="0">
+                <a:latin typeface="Times New Roman"/>
+                <a:cs typeface="Times New Roman"/>
+              </a:rPr>
+              <a:t>Domains</a:t>
             </a:r>
             <a:endParaRPr lang="en-US" dirty="0">
               <a:latin typeface="Times New Roman"/>
@@ -4378,7 +4401,7 @@
         <p:spPr bwMode="auto">
           <a:xfrm>
             <a:off x="347416" y="250636"/>
-            <a:ext cx="1623317" cy="409184"/>
+            <a:ext cx="1258519" cy="409184"/>
           </a:xfrm>
           <a:prstGeom prst="rect">
             <a:avLst/>
@@ -4408,6 +4431,197 @@
           </a:extLst>
         </p:spPr>
       </p:pic>
+      <p:sp>
+        <p:nvSpPr>
+          <p:cNvPr id="5" name="Subtitle 2"/>
+          <p:cNvSpPr txBox="1">
+            <a:spLocks/>
+          </p:cNvSpPr>
+          <p:nvPr/>
+        </p:nvSpPr>
+        <p:spPr>
+          <a:xfrm>
+            <a:off x="1524000" y="797483"/>
+            <a:ext cx="6400800" cy="987072"/>
+          </a:xfrm>
+          <a:prstGeom prst="rect">
+            <a:avLst/>
+          </a:prstGeom>
+        </p:spPr>
+        <p:txBody>
+          <a:bodyPr vert="horz" lIns="91440" tIns="45720" rIns="91440" bIns="45720" rtlCol="0">
+            <a:normAutofit/>
+          </a:bodyPr>
+          <a:lstStyle>
+            <a:lvl1pPr marL="0" indent="0" algn="ctr" defTabSz="457200" rtl="0" eaLnBrk="1" latinLnBrk="0" hangingPunct="1">
+              <a:spcBef>
+                <a:spcPct val="20000"/>
+              </a:spcBef>
+              <a:buFont typeface="Arial"/>
+              <a:buNone/>
+              <a:defRPr sz="3200" kern="1200">
+                <a:solidFill>
+                  <a:schemeClr val="tx1">
+                    <a:tint val="75000"/>
+                  </a:schemeClr>
+                </a:solidFill>
+                <a:latin typeface="+mn-lt"/>
+                <a:ea typeface="+mn-ea"/>
+                <a:cs typeface="+mn-cs"/>
+              </a:defRPr>
+            </a:lvl1pPr>
+            <a:lvl2pPr marL="457200" indent="0" algn="ctr" defTabSz="457200" rtl="0" eaLnBrk="1" latinLnBrk="0" hangingPunct="1">
+              <a:spcBef>
+                <a:spcPct val="20000"/>
+              </a:spcBef>
+              <a:buFont typeface="Arial"/>
+              <a:buNone/>
+              <a:defRPr sz="2800" kern="1200">
+                <a:solidFill>
+                  <a:schemeClr val="tx1">
+                    <a:tint val="75000"/>
+                  </a:schemeClr>
+                </a:solidFill>
+                <a:latin typeface="+mn-lt"/>
+                <a:ea typeface="+mn-ea"/>
+                <a:cs typeface="+mn-cs"/>
+              </a:defRPr>
+            </a:lvl2pPr>
+            <a:lvl3pPr marL="914400" indent="0" algn="ctr" defTabSz="457200" rtl="0" eaLnBrk="1" latinLnBrk="0" hangingPunct="1">
+              <a:spcBef>
+                <a:spcPct val="20000"/>
+              </a:spcBef>
+              <a:buFont typeface="Arial"/>
+              <a:buNone/>
+              <a:defRPr sz="2400" kern="1200">
+                <a:solidFill>
+                  <a:schemeClr val="tx1">
+                    <a:tint val="75000"/>
+                  </a:schemeClr>
+                </a:solidFill>
+                <a:latin typeface="+mn-lt"/>
+                <a:ea typeface="+mn-ea"/>
+                <a:cs typeface="+mn-cs"/>
+              </a:defRPr>
+            </a:lvl3pPr>
+            <a:lvl4pPr marL="1371600" indent="0" algn="ctr" defTabSz="457200" rtl="0" eaLnBrk="1" latinLnBrk="0" hangingPunct="1">
+              <a:spcBef>
+                <a:spcPct val="20000"/>
+              </a:spcBef>
+              <a:buFont typeface="Arial"/>
+              <a:buNone/>
+              <a:defRPr sz="2000" kern="1200">
+                <a:solidFill>
+                  <a:schemeClr val="tx1">
+                    <a:tint val="75000"/>
+                  </a:schemeClr>
+                </a:solidFill>
+                <a:latin typeface="+mn-lt"/>
+                <a:ea typeface="+mn-ea"/>
+                <a:cs typeface="+mn-cs"/>
+              </a:defRPr>
+            </a:lvl4pPr>
+            <a:lvl5pPr marL="1828800" indent="0" algn="ctr" defTabSz="457200" rtl="0" eaLnBrk="1" latinLnBrk="0" hangingPunct="1">
+              <a:spcBef>
+                <a:spcPct val="20000"/>
+              </a:spcBef>
+              <a:buFont typeface="Arial"/>
+              <a:buNone/>
+              <a:defRPr sz="2000" kern="1200">
+                <a:solidFill>
+                  <a:schemeClr val="tx1">
+                    <a:tint val="75000"/>
+                  </a:schemeClr>
+                </a:solidFill>
+                <a:latin typeface="+mn-lt"/>
+                <a:ea typeface="+mn-ea"/>
+                <a:cs typeface="+mn-cs"/>
+              </a:defRPr>
+            </a:lvl5pPr>
+            <a:lvl6pPr marL="2286000" indent="0" algn="ctr" defTabSz="457200" rtl="0" eaLnBrk="1" latinLnBrk="0" hangingPunct="1">
+              <a:spcBef>
+                <a:spcPct val="20000"/>
+              </a:spcBef>
+              <a:buFont typeface="Arial"/>
+              <a:buNone/>
+              <a:defRPr sz="2000" kern="1200">
+                <a:solidFill>
+                  <a:schemeClr val="tx1">
+                    <a:tint val="75000"/>
+                  </a:schemeClr>
+                </a:solidFill>
+                <a:latin typeface="+mn-lt"/>
+                <a:ea typeface="+mn-ea"/>
+                <a:cs typeface="+mn-cs"/>
+              </a:defRPr>
+            </a:lvl6pPr>
+            <a:lvl7pPr marL="2743200" indent="0" algn="ctr" defTabSz="457200" rtl="0" eaLnBrk="1" latinLnBrk="0" hangingPunct="1">
+              <a:spcBef>
+                <a:spcPct val="20000"/>
+              </a:spcBef>
+              <a:buFont typeface="Arial"/>
+              <a:buNone/>
+              <a:defRPr sz="2000" kern="1200">
+                <a:solidFill>
+                  <a:schemeClr val="tx1">
+                    <a:tint val="75000"/>
+                  </a:schemeClr>
+                </a:solidFill>
+                <a:latin typeface="+mn-lt"/>
+                <a:ea typeface="+mn-ea"/>
+                <a:cs typeface="+mn-cs"/>
+              </a:defRPr>
+            </a:lvl7pPr>
+            <a:lvl8pPr marL="3200400" indent="0" algn="ctr" defTabSz="457200" rtl="0" eaLnBrk="1" latinLnBrk="0" hangingPunct="1">
+              <a:spcBef>
+                <a:spcPct val="20000"/>
+              </a:spcBef>
+              <a:buFont typeface="Arial"/>
+              <a:buNone/>
+              <a:defRPr sz="2000" kern="1200">
+                <a:solidFill>
+                  <a:schemeClr val="tx1">
+                    <a:tint val="75000"/>
+                  </a:schemeClr>
+                </a:solidFill>
+                <a:latin typeface="+mn-lt"/>
+                <a:ea typeface="+mn-ea"/>
+                <a:cs typeface="+mn-cs"/>
+              </a:defRPr>
+            </a:lvl8pPr>
+            <a:lvl9pPr marL="3657600" indent="0" algn="ctr" defTabSz="457200" rtl="0" eaLnBrk="1" latinLnBrk="0" hangingPunct="1">
+              <a:spcBef>
+                <a:spcPct val="20000"/>
+              </a:spcBef>
+              <a:buFont typeface="Arial"/>
+              <a:buNone/>
+              <a:defRPr sz="2000" kern="1200">
+                <a:solidFill>
+                  <a:schemeClr val="tx1">
+                    <a:tint val="75000"/>
+                  </a:schemeClr>
+                </a:solidFill>
+                <a:latin typeface="+mn-lt"/>
+                <a:ea typeface="+mn-ea"/>
+                <a:cs typeface="+mn-cs"/>
+              </a:defRPr>
+            </a:lvl9pPr>
+          </a:lstStyle>
+          <a:p>
+            <a:r>
+              <a:rPr lang="en-US" dirty="0" smtClean="0">
+                <a:latin typeface="Times New Roman"/>
+                <a:cs typeface="Times New Roman"/>
+              </a:rPr>
+              <a:t>Welcome to my Thesis Seminar on</a:t>
+            </a:r>
+            <a:endParaRPr lang="en-US" sz="2200" dirty="0">
+              <a:latin typeface="Times New Roman"/>
+              <a:cs typeface="Times New Roman"/>
+            </a:endParaRPr>
+          </a:p>
+        </p:txBody>
+      </p:sp>
     </p:spTree>
     <p:extLst>
       <p:ext uri="{BB962C8B-B14F-4D97-AF65-F5344CB8AC3E}">
@@ -4469,11 +4683,15 @@
           <a:p>
             <a:r>
               <a:rPr lang="en-US" dirty="0" smtClean="0">
-                <a:cs typeface="+mj-cs"/>
+                <a:latin typeface="Times New Roman"/>
+                <a:cs typeface="Times New Roman"/>
               </a:rPr>
               <a:t>Dirt Spot Sweeping Random Strategy</a:t>
             </a:r>
-            <a:endParaRPr lang="en-US" dirty="0"/>
+            <a:endParaRPr lang="en-US" dirty="0">
+              <a:latin typeface="Times New Roman"/>
+              <a:cs typeface="Times New Roman"/>
+            </a:endParaRPr>
           </a:p>
         </p:txBody>
       </p:sp>
@@ -4496,13 +4714,18 @@
               <a:defRPr/>
             </a:pPr>
             <a:r>
-              <a:rPr lang="en-US" sz="2800" dirty="0"/>
+              <a:rPr lang="en-US" sz="2800" dirty="0">
+                <a:latin typeface="Times New Roman"/>
+                <a:cs typeface="Times New Roman"/>
+              </a:rPr>
               <a:t>Based on three strategies</a:t>
             </a:r>
             <a:endParaRPr lang="en-US" sz="2800" dirty="0">
               <a:solidFill>
                 <a:srgbClr val="FC0128"/>
               </a:solidFill>
+              <a:latin typeface="Times New Roman"/>
+              <a:cs typeface="Times New Roman"/>
             </a:endParaRPr>
           </a:p>
           <a:p>
@@ -4510,7 +4733,10 @@
               <a:defRPr/>
             </a:pPr>
             <a:r>
-              <a:rPr lang="en-US" sz="2400" dirty="0"/>
+              <a:rPr lang="en-US" sz="2400" dirty="0">
+                <a:latin typeface="Times New Roman"/>
+                <a:cs typeface="Times New Roman"/>
+              </a:rPr>
               <a:t>Random</a:t>
             </a:r>
           </a:p>
@@ -4519,7 +4745,10 @@
               <a:defRPr/>
             </a:pPr>
             <a:r>
-              <a:rPr lang="en-US" sz="2400" dirty="0"/>
+              <a:rPr lang="en-US" sz="2400" dirty="0">
+                <a:latin typeface="Times New Roman"/>
+                <a:cs typeface="Times New Roman"/>
+              </a:rPr>
               <a:t>Random Plus</a:t>
             </a:r>
           </a:p>
@@ -4528,14 +4757,23 @@
               <a:defRPr/>
             </a:pPr>
             <a:r>
-              <a:rPr lang="en-US" sz="2400" dirty="0"/>
+              <a:rPr lang="en-US" sz="2400" dirty="0">
+                <a:latin typeface="Times New Roman"/>
+                <a:cs typeface="Times New Roman"/>
+              </a:rPr>
               <a:t>Spot </a:t>
             </a:r>
             <a:r>
-              <a:rPr lang="en-US" sz="2400" dirty="0" smtClean="0"/>
+              <a:rPr lang="en-US" sz="2400" dirty="0" smtClean="0">
+                <a:latin typeface="Times New Roman"/>
+                <a:cs typeface="Times New Roman"/>
+              </a:rPr>
               <a:t>Sweeping</a:t>
             </a:r>
-            <a:endParaRPr lang="en-US" sz="2400" dirty="0"/>
+            <a:endParaRPr lang="en-US" sz="2400" dirty="0">
+              <a:latin typeface="Times New Roman"/>
+              <a:cs typeface="Times New Roman"/>
+            </a:endParaRPr>
           </a:p>
         </p:txBody>
       </p:sp>
@@ -4603,6 +4841,13 @@
   <p:clrMapOvr>
     <a:masterClrMapping/>
   </p:clrMapOvr>
+  <p:timing>
+    <p:tnLst>
+      <p:par>
+        <p:cTn xmlns:p14="http://schemas.microsoft.com/office/powerpoint/2010/main" id="1" dur="indefinite" restart="never" nodeType="tmRoot"/>
+      </p:par>
+    </p:tnLst>
+  </p:timing>
 </p:sld>
 </file>
 
@@ -4642,11 +4887,15 @@
           <a:p>
             <a:r>
               <a:rPr lang="en-US" dirty="0" smtClean="0">
-                <a:cs typeface="+mj-cs"/>
+                <a:latin typeface="Times New Roman"/>
+                <a:cs typeface="Times New Roman"/>
               </a:rPr>
               <a:t>Working Mechanism of DSSR Strategy</a:t>
             </a:r>
-            <a:endParaRPr lang="en-US" dirty="0"/>
+            <a:endParaRPr lang="en-US" dirty="0">
+              <a:latin typeface="Times New Roman"/>
+              <a:cs typeface="Times New Roman"/>
+            </a:endParaRPr>
           </a:p>
         </p:txBody>
       </p:sp>
@@ -4714,6 +4963,13 @@
   <p:clrMapOvr>
     <a:masterClrMapping/>
   </p:clrMapOvr>
+  <p:timing>
+    <p:tnLst>
+      <p:par>
+        <p:cTn xmlns:p14="http://schemas.microsoft.com/office/powerpoint/2010/main" id="1" dur="indefinite" restart="never" nodeType="tmRoot"/>
+      </p:par>
+    </p:tnLst>
+  </p:timing>
 </p:sld>
 </file>
 
@@ -4753,11 +5009,15 @@
           <a:p>
             <a:r>
               <a:rPr lang="en-US" dirty="0" smtClean="0">
-                <a:cs typeface="+mj-cs"/>
+                <a:latin typeface="Times New Roman"/>
+                <a:cs typeface="Times New Roman"/>
               </a:rPr>
               <a:t>Example to illustrate working of DSSR strategy</a:t>
             </a:r>
-            <a:endParaRPr lang="en-US" dirty="0"/>
+            <a:endParaRPr lang="en-US" dirty="0">
+              <a:latin typeface="Times New Roman"/>
+              <a:cs typeface="Times New Roman"/>
+            </a:endParaRPr>
           </a:p>
         </p:txBody>
       </p:sp>
@@ -4788,6 +5048,8 @@
                 <a:solidFill>
                   <a:srgbClr val="0000FF"/>
                 </a:solidFill>
+                <a:latin typeface="Times New Roman"/>
+                <a:cs typeface="Times New Roman"/>
               </a:rPr>
               <a:t>/**</a:t>
             </a:r>
@@ -4803,6 +5065,8 @@
                 <a:solidFill>
                   <a:srgbClr val="0000FF"/>
                 </a:solidFill>
+                <a:latin typeface="Times New Roman"/>
+                <a:cs typeface="Times New Roman"/>
               </a:rPr>
               <a:t> * Calculate square of given number and verify results.</a:t>
             </a:r>
@@ -4818,6 +5082,8 @@
                 <a:solidFill>
                   <a:srgbClr val="0000FF"/>
                 </a:solidFill>
+                <a:latin typeface="Times New Roman"/>
+                <a:cs typeface="Times New Roman"/>
               </a:rPr>
               <a:t> * The code contain 3 faults.</a:t>
             </a:r>
@@ -4833,6 +5099,8 @@
                 <a:solidFill>
                   <a:srgbClr val="0000FF"/>
                 </a:solidFill>
+                <a:latin typeface="Times New Roman"/>
+                <a:cs typeface="Times New Roman"/>
               </a:rPr>
               <a:t> * @author (</a:t>
             </a:r>
@@ -4841,6 +5109,8 @@
                 <a:solidFill>
                   <a:srgbClr val="0000FF"/>
                 </a:solidFill>
+                <a:latin typeface="Times New Roman"/>
+                <a:cs typeface="Times New Roman"/>
               </a:rPr>
               <a:t>Mian and Manuel)</a:t>
             </a:r>
@@ -4856,6 +5126,8 @@
                 <a:solidFill>
                   <a:srgbClr val="0000FF"/>
                 </a:solidFill>
+                <a:latin typeface="Times New Roman"/>
+                <a:cs typeface="Times New Roman"/>
               </a:rPr>
               <a:t> */</a:t>
             </a:r>
@@ -4867,7 +5139,10 @@
               <a:defRPr/>
             </a:pPr>
             <a:r>
-              <a:rPr lang="en-US" dirty="0"/>
+              <a:rPr lang="en-US" dirty="0">
+                <a:latin typeface="Times New Roman"/>
+                <a:cs typeface="Times New Roman"/>
+              </a:rPr>
               <a:t>public class Math1{</a:t>
             </a:r>
           </a:p>
@@ -4878,23 +5153,38 @@
               <a:defRPr/>
             </a:pPr>
             <a:r>
-              <a:rPr lang="en-US" dirty="0"/>
+              <a:rPr lang="en-US" dirty="0">
+                <a:latin typeface="Times New Roman"/>
+                <a:cs typeface="Times New Roman"/>
+              </a:rPr>
               <a:t>	public void </a:t>
             </a:r>
             <a:r>
-              <a:rPr lang="en-US" dirty="0" err="1"/>
+              <a:rPr lang="en-US" dirty="0" err="1">
+                <a:latin typeface="Times New Roman"/>
+                <a:cs typeface="Times New Roman"/>
+              </a:rPr>
               <a:t>calc</a:t>
             </a:r>
             <a:r>
-              <a:rPr lang="en-US" dirty="0"/>
+              <a:rPr lang="en-US" dirty="0">
+                <a:latin typeface="Times New Roman"/>
+                <a:cs typeface="Times New Roman"/>
+              </a:rPr>
               <a:t> (</a:t>
             </a:r>
             <a:r>
-              <a:rPr lang="en-US" dirty="0" err="1"/>
+              <a:rPr lang="en-US" dirty="0" err="1">
+                <a:latin typeface="Times New Roman"/>
+                <a:cs typeface="Times New Roman"/>
+              </a:rPr>
               <a:t>int</a:t>
             </a:r>
             <a:r>
-              <a:rPr lang="en-US" dirty="0"/>
+              <a:rPr lang="en-US" dirty="0">
+                <a:latin typeface="Times New Roman"/>
+                <a:cs typeface="Times New Roman"/>
+              </a:rPr>
               <a:t> num1) {</a:t>
             </a:r>
           </a:p>
@@ -4905,7 +5195,10 @@
               <a:defRPr/>
             </a:pPr>
             <a:r>
-              <a:rPr lang="en-US" dirty="0"/>
+              <a:rPr lang="en-US" dirty="0">
+                <a:latin typeface="Times New Roman"/>
+                <a:cs typeface="Times New Roman"/>
+              </a:rPr>
               <a:t>		</a:t>
             </a:r>
             <a:r>
@@ -4913,6 +5206,8 @@
                 <a:solidFill>
                   <a:srgbClr val="0B52FC"/>
                 </a:solidFill>
+                <a:latin typeface="Times New Roman"/>
+                <a:cs typeface="Times New Roman"/>
               </a:rPr>
               <a:t>// Square num1 and store result.</a:t>
             </a:r>
@@ -4924,15 +5219,24 @@
               <a:defRPr/>
             </a:pPr>
             <a:r>
-              <a:rPr lang="en-US" dirty="0"/>
+              <a:rPr lang="en-US" dirty="0">
+                <a:latin typeface="Times New Roman"/>
+                <a:cs typeface="Times New Roman"/>
+              </a:rPr>
               <a:t>		</a:t>
             </a:r>
             <a:r>
-              <a:rPr lang="en-US" dirty="0" err="1"/>
+              <a:rPr lang="en-US" dirty="0" err="1">
+                <a:latin typeface="Times New Roman"/>
+                <a:cs typeface="Times New Roman"/>
+              </a:rPr>
               <a:t>int</a:t>
             </a:r>
             <a:r>
-              <a:rPr lang="en-US" dirty="0"/>
+              <a:rPr lang="en-US" dirty="0">
+                <a:latin typeface="Times New Roman"/>
+                <a:cs typeface="Times New Roman"/>
+              </a:rPr>
               <a:t> result1 = num1 * num1;</a:t>
             </a:r>
           </a:p>
@@ -4943,19 +5247,31 @@
               <a:defRPr/>
             </a:pPr>
             <a:r>
-              <a:rPr lang="en-US" dirty="0"/>
+              <a:rPr lang="en-US" dirty="0">
+                <a:latin typeface="Times New Roman"/>
+                <a:cs typeface="Times New Roman"/>
+              </a:rPr>
               <a:t>		</a:t>
             </a:r>
             <a:r>
-              <a:rPr lang="en-US" dirty="0" err="1"/>
+              <a:rPr lang="en-US" dirty="0" err="1">
+                <a:latin typeface="Times New Roman"/>
+                <a:cs typeface="Times New Roman"/>
+              </a:rPr>
               <a:t>int</a:t>
             </a:r>
             <a:r>
-              <a:rPr lang="en-US" dirty="0"/>
+              <a:rPr lang="en-US" dirty="0">
+                <a:latin typeface="Times New Roman"/>
+                <a:cs typeface="Times New Roman"/>
+              </a:rPr>
               <a:t> result2 = result1 / num1; 		</a:t>
             </a:r>
             <a:r>
-              <a:rPr lang="en-US" dirty="0" smtClean="0"/>
+              <a:rPr lang="en-US" dirty="0" smtClean="0">
+                <a:latin typeface="Times New Roman"/>
+                <a:cs typeface="Times New Roman"/>
+              </a:rPr>
               <a:t>	</a:t>
             </a:r>
             <a:r>
@@ -4963,6 +5279,8 @@
                 <a:solidFill>
                   <a:srgbClr val="0B52FC"/>
                 </a:solidFill>
+                <a:latin typeface="Times New Roman"/>
+                <a:cs typeface="Times New Roman"/>
               </a:rPr>
               <a:t>/</a:t>
             </a:r>
@@ -4971,6 +5289,8 @@
                 <a:solidFill>
                   <a:srgbClr val="0B52FC"/>
                 </a:solidFill>
+                <a:latin typeface="Times New Roman"/>
+                <a:cs typeface="Times New Roman"/>
               </a:rPr>
               <a:t>/ 1 </a:t>
             </a:r>
@@ -4982,15 +5302,24 @@
               <a:defRPr/>
             </a:pPr>
             <a:r>
-              <a:rPr lang="en-US" dirty="0"/>
+              <a:rPr lang="en-US" dirty="0">
+                <a:latin typeface="Times New Roman"/>
+                <a:cs typeface="Times New Roman"/>
+              </a:rPr>
               <a:t>		assert </a:t>
             </a:r>
             <a:r>
-              <a:rPr lang="en-US" dirty="0" err="1"/>
+              <a:rPr lang="en-US" dirty="0" err="1">
+                <a:latin typeface="Times New Roman"/>
+                <a:cs typeface="Times New Roman"/>
+              </a:rPr>
               <a:t>Math.sqrt</a:t>
             </a:r>
             <a:r>
-              <a:rPr lang="en-US" dirty="0"/>
+              <a:rPr lang="en-US" dirty="0">
+                <a:latin typeface="Times New Roman"/>
+                <a:cs typeface="Times New Roman"/>
+              </a:rPr>
               <a:t>(result1) == num1; 	</a:t>
             </a:r>
             <a:r>
@@ -4998,6 +5327,8 @@
                 <a:solidFill>
                   <a:srgbClr val="0B52FC"/>
                 </a:solidFill>
+                <a:latin typeface="Times New Roman"/>
+                <a:cs typeface="Times New Roman"/>
               </a:rPr>
               <a:t>// 2 </a:t>
             </a:r>
@@ -5009,19 +5340,31 @@
               <a:defRPr/>
             </a:pPr>
             <a:r>
-              <a:rPr lang="nb-NO" dirty="0"/>
+              <a:rPr lang="nb-NO" dirty="0">
+                <a:latin typeface="Times New Roman"/>
+                <a:cs typeface="Times New Roman"/>
+              </a:rPr>
               <a:t>		</a:t>
             </a:r>
             <a:r>
-              <a:rPr lang="nb-NO" dirty="0" err="1"/>
+              <a:rPr lang="nb-NO" dirty="0" err="1">
+                <a:latin typeface="Times New Roman"/>
+                <a:cs typeface="Times New Roman"/>
+              </a:rPr>
               <a:t>assert</a:t>
             </a:r>
             <a:r>
-              <a:rPr lang="nb-NO" dirty="0"/>
+              <a:rPr lang="nb-NO" dirty="0">
+                <a:latin typeface="Times New Roman"/>
+                <a:cs typeface="Times New Roman"/>
+              </a:rPr>
               <a:t> result1 &gt;= num1; 			</a:t>
             </a:r>
             <a:r>
-              <a:rPr lang="nb-NO" dirty="0" smtClean="0"/>
+              <a:rPr lang="nb-NO" dirty="0" smtClean="0">
+                <a:latin typeface="Times New Roman"/>
+                <a:cs typeface="Times New Roman"/>
+              </a:rPr>
               <a:t>	</a:t>
             </a:r>
             <a:r>
@@ -5029,6 +5372,8 @@
                 <a:solidFill>
                   <a:srgbClr val="0B52FC"/>
                 </a:solidFill>
+                <a:latin typeface="Times New Roman"/>
+                <a:cs typeface="Times New Roman"/>
               </a:rPr>
               <a:t>/</a:t>
             </a:r>
@@ -5037,6 +5382,8 @@
                 <a:solidFill>
                   <a:srgbClr val="0B52FC"/>
                 </a:solidFill>
+                <a:latin typeface="Times New Roman"/>
+                <a:cs typeface="Times New Roman"/>
               </a:rPr>
               <a:t>/ 3</a:t>
             </a:r>
@@ -5048,7 +5395,10 @@
               <a:defRPr/>
             </a:pPr>
             <a:r>
-              <a:rPr lang="nb-NO" dirty="0"/>
+              <a:rPr lang="nb-NO" dirty="0">
+                <a:latin typeface="Times New Roman"/>
+                <a:cs typeface="Times New Roman"/>
+              </a:rPr>
               <a:t>	} </a:t>
             </a:r>
           </a:p>
@@ -5059,16 +5409,25 @@
               <a:defRPr/>
             </a:pPr>
             <a:r>
-              <a:rPr lang="nb-NO" dirty="0"/>
+              <a:rPr lang="nb-NO" dirty="0">
+                <a:latin typeface="Times New Roman"/>
+                <a:cs typeface="Times New Roman"/>
+              </a:rPr>
               <a:t>}</a:t>
             </a:r>
-            <a:endParaRPr lang="en-US" dirty="0"/>
+            <a:endParaRPr lang="en-US" dirty="0">
+              <a:latin typeface="Times New Roman"/>
+              <a:cs typeface="Times New Roman"/>
+            </a:endParaRPr>
           </a:p>
           <a:p>
             <a:pPr marL="0" indent="0">
               <a:buNone/>
             </a:pPr>
-            <a:endParaRPr lang="en-US" dirty="0"/>
+            <a:endParaRPr lang="en-US" dirty="0">
+              <a:latin typeface="Times New Roman"/>
+              <a:cs typeface="Times New Roman"/>
+            </a:endParaRPr>
           </a:p>
         </p:txBody>
       </p:sp>
@@ -5082,6 +5441,13 @@
   <p:clrMapOvr>
     <a:masterClrMapping/>
   </p:clrMapOvr>
+  <p:timing>
+    <p:tnLst>
+      <p:par>
+        <p:cTn xmlns:p14="http://schemas.microsoft.com/office/powerpoint/2010/main" id="1" dur="indefinite" restart="never" nodeType="tmRoot"/>
+      </p:par>
+    </p:tnLst>
+  </p:timing>
 </p:sld>
 </file>
 
@@ -5126,10 +5492,16 @@
           <a:p>
             <a:pPr algn="l"/>
             <a:r>
-              <a:rPr lang="en-US" sz="3200" dirty="0" smtClean="0"/>
+              <a:rPr lang="en-US" sz="3200" dirty="0" smtClean="0">
+                <a:latin typeface="Times New Roman"/>
+                <a:cs typeface="Times New Roman"/>
+              </a:rPr>
               <a:t>Performance of DSSR compared to R and R+</a:t>
             </a:r>
-            <a:endParaRPr lang="en-US" sz="3200" dirty="0"/>
+            <a:endParaRPr lang="en-US" sz="3200" dirty="0">
+              <a:latin typeface="Times New Roman"/>
+              <a:cs typeface="Times New Roman"/>
+            </a:endParaRPr>
           </a:p>
         </p:txBody>
       </p:sp>
@@ -5157,23 +5529,38 @@
               <a:defRPr/>
             </a:pPr>
             <a:r>
-              <a:rPr lang="en-US" sz="2000" dirty="0"/>
+              <a:rPr lang="en-US" sz="2000" dirty="0">
+                <a:latin typeface="Times New Roman"/>
+                <a:cs typeface="Times New Roman"/>
+              </a:rPr>
               <a:t>60 classes </a:t>
             </a:r>
             <a:r>
-              <a:rPr lang="en-US" sz="2000" dirty="0" smtClean="0"/>
+              <a:rPr lang="en-US" sz="2000" dirty="0" smtClean="0">
+                <a:latin typeface="Times New Roman"/>
+                <a:cs typeface="Times New Roman"/>
+              </a:rPr>
               <a:t>from </a:t>
             </a:r>
             <a:r>
-              <a:rPr lang="en-US" sz="2000" dirty="0"/>
+              <a:rPr lang="en-US" sz="2000" dirty="0">
+                <a:latin typeface="Times New Roman"/>
+                <a:cs typeface="Times New Roman"/>
+              </a:rPr>
               <a:t>32 </a:t>
             </a:r>
             <a:r>
-              <a:rPr lang="en-US" sz="2000" dirty="0" smtClean="0"/>
+              <a:rPr lang="en-US" sz="2000" dirty="0" smtClean="0">
+                <a:latin typeface="Times New Roman"/>
+                <a:cs typeface="Times New Roman"/>
+              </a:rPr>
               <a:t>projects </a:t>
             </a:r>
             <a:r>
-              <a:rPr lang="en-US" sz="2000" dirty="0"/>
+              <a:rPr lang="en-US" sz="2000" dirty="0">
+                <a:latin typeface="Times New Roman"/>
+                <a:cs typeface="Times New Roman"/>
+              </a:rPr>
               <a:t>were tested by R, R+ and DSSR strategy</a:t>
             </a:r>
           </a:p>
@@ -5182,7 +5569,10 @@
               <a:defRPr/>
             </a:pPr>
             <a:r>
-              <a:rPr lang="en-US" sz="2000" dirty="0"/>
+              <a:rPr lang="en-US" sz="2000" dirty="0">
+                <a:latin typeface="Times New Roman"/>
+                <a:cs typeface="Times New Roman"/>
+              </a:rPr>
               <a:t>In 43 classes all the strategies found same number of faults</a:t>
             </a:r>
           </a:p>
@@ -5191,7 +5581,10 @@
               <a:defRPr/>
             </a:pPr>
             <a:r>
-              <a:rPr lang="en-US" sz="2000" dirty="0"/>
+              <a:rPr lang="en-US" sz="2000" dirty="0">
+                <a:latin typeface="Times New Roman"/>
+                <a:cs typeface="Times New Roman"/>
+              </a:rPr>
               <a:t>In 17 classes, the performance varied</a:t>
             </a:r>
           </a:p>
@@ -5200,43 +5593,73 @@
               <a:defRPr/>
             </a:pPr>
             <a:r>
-              <a:rPr lang="en-US" sz="2000" dirty="0"/>
+              <a:rPr lang="en-US" sz="2000" dirty="0">
+                <a:latin typeface="Times New Roman"/>
+                <a:cs typeface="Times New Roman"/>
+              </a:rPr>
               <a:t>DSSR strategy found the highest </a:t>
             </a:r>
             <a:r>
-              <a:rPr lang="en-US" sz="2000" dirty="0" smtClean="0"/>
+              <a:rPr lang="en-US" sz="2000" dirty="0" smtClean="0">
+                <a:latin typeface="Times New Roman"/>
+                <a:cs typeface="Times New Roman"/>
+              </a:rPr>
               <a:t>number of </a:t>
             </a:r>
             <a:r>
-              <a:rPr lang="en-US" sz="2000" dirty="0"/>
+              <a:rPr lang="en-US" sz="2000" dirty="0">
+                <a:latin typeface="Times New Roman"/>
+                <a:cs typeface="Times New Roman"/>
+              </a:rPr>
               <a:t>unique </a:t>
             </a:r>
             <a:r>
-              <a:rPr lang="en-US" sz="2000" dirty="0" smtClean="0"/>
+              <a:rPr lang="en-US" sz="2000" dirty="0" smtClean="0">
+                <a:latin typeface="Times New Roman"/>
+                <a:cs typeface="Times New Roman"/>
+              </a:rPr>
               <a:t>failures </a:t>
             </a:r>
             <a:r>
-              <a:rPr lang="en-US" sz="2000" dirty="0"/>
+              <a:rPr lang="en-US" sz="2000" dirty="0">
+                <a:latin typeface="Times New Roman"/>
+                <a:cs typeface="Times New Roman"/>
+              </a:rPr>
               <a:t>() </a:t>
             </a:r>
             <a:r>
-              <a:rPr lang="en-US" sz="2000" dirty="0" smtClean="0"/>
+              <a:rPr lang="en-US" sz="2000" dirty="0" smtClean="0">
+                <a:latin typeface="Times New Roman"/>
+                <a:cs typeface="Times New Roman"/>
+              </a:rPr>
               <a:t>followed by </a:t>
             </a:r>
             <a:r>
-              <a:rPr lang="en-US" sz="2000" dirty="0"/>
+              <a:rPr lang="en-US" sz="2000" dirty="0">
+                <a:latin typeface="Times New Roman"/>
+                <a:cs typeface="Times New Roman"/>
+              </a:rPr>
               <a:t>R+ () and </a:t>
             </a:r>
             <a:r>
-              <a:rPr lang="en-US" sz="2000" dirty="0" smtClean="0"/>
+              <a:rPr lang="en-US" sz="2000" dirty="0" smtClean="0">
+                <a:latin typeface="Times New Roman"/>
+                <a:cs typeface="Times New Roman"/>
+              </a:rPr>
               <a:t>R </a:t>
             </a:r>
             <a:r>
-              <a:rPr lang="en-US" sz="2000" dirty="0"/>
+              <a:rPr lang="en-US" sz="2000" dirty="0">
+                <a:latin typeface="Times New Roman"/>
+                <a:cs typeface="Times New Roman"/>
+              </a:rPr>
               <a:t>found the lowest number (</a:t>
             </a:r>
             <a:r>
-              <a:rPr lang="en-US" sz="2000" dirty="0" smtClean="0"/>
+              <a:rPr lang="en-US" sz="2000" dirty="0" smtClean="0">
+                <a:latin typeface="Times New Roman"/>
+                <a:cs typeface="Times New Roman"/>
+              </a:rPr>
               <a:t>)</a:t>
             </a:r>
           </a:p>
@@ -5245,32 +5668,53 @@
               <a:defRPr/>
             </a:pPr>
             <a:r>
-              <a:rPr lang="en-US" sz="2000" dirty="0" smtClean="0"/>
+              <a:rPr lang="en-US" sz="2000" dirty="0" smtClean="0">
+                <a:latin typeface="Times New Roman"/>
+                <a:cs typeface="Times New Roman"/>
+              </a:rPr>
               <a:t>On </a:t>
             </a:r>
             <a:r>
-              <a:rPr lang="en-US" sz="2000" dirty="0"/>
+              <a:rPr lang="en-US" sz="2000" dirty="0">
+                <a:latin typeface="Times New Roman"/>
+                <a:cs typeface="Times New Roman"/>
+              </a:rPr>
               <a:t>overall basis DSSR </a:t>
             </a:r>
             <a:r>
-              <a:rPr lang="en-US" sz="2000" dirty="0" smtClean="0"/>
+              <a:rPr lang="en-US" sz="2000" dirty="0" smtClean="0">
+                <a:latin typeface="Times New Roman"/>
+                <a:cs typeface="Times New Roman"/>
+              </a:rPr>
               <a:t>strategy</a:t>
             </a:r>
             <a:br>
-              <a:rPr lang="en-US" sz="2000" dirty="0" smtClean="0"/>
+              <a:rPr lang="en-US" sz="2000" dirty="0" smtClean="0">
+                <a:latin typeface="Times New Roman"/>
+                <a:cs typeface="Times New Roman"/>
+              </a:rPr>
             </a:br>
             <a:r>
-              <a:rPr lang="en-US" sz="2000" dirty="0" smtClean="0"/>
+              <a:rPr lang="en-US" sz="2000" dirty="0" smtClean="0">
+                <a:latin typeface="Times New Roman"/>
+                <a:cs typeface="Times New Roman"/>
+              </a:rPr>
               <a:t>performed </a:t>
             </a:r>
             <a:r>
-              <a:rPr lang="en-US" sz="2000" dirty="0"/>
+              <a:rPr lang="en-US" sz="2000" dirty="0">
+                <a:latin typeface="Times New Roman"/>
+                <a:cs typeface="Times New Roman"/>
+              </a:rPr>
               <a:t>better than R and R+.</a:t>
             </a:r>
           </a:p>
           <a:p>
             <a:pPr lvl="1"/>
-            <a:endParaRPr lang="en-US" dirty="0"/>
+            <a:endParaRPr lang="en-US" dirty="0">
+              <a:latin typeface="Times New Roman"/>
+              <a:cs typeface="Times New Roman"/>
+            </a:endParaRPr>
           </a:p>
         </p:txBody>
       </p:sp>
@@ -5347,17 +5791,23 @@
         </p:nvSpPr>
         <p:spPr/>
         <p:txBody>
-          <a:bodyPr/>
+          <a:bodyPr>
+            <a:normAutofit fontScale="90000"/>
+          </a:bodyPr>
           <a:lstStyle/>
           <a:p>
             <a:pPr algn="l"/>
             <a:r>
               <a:rPr lang="en-US" dirty="0" smtClean="0">
-                <a:cs typeface="+mj-cs"/>
+                <a:latin typeface="Times New Roman"/>
+                <a:cs typeface="Times New Roman"/>
               </a:rPr>
               <a:t>Test Results of 17/60 classes</a:t>
             </a:r>
-            <a:endParaRPr lang="en-US" dirty="0"/>
+            <a:endParaRPr lang="en-US" dirty="0">
+              <a:latin typeface="Times New Roman"/>
+              <a:cs typeface="Times New Roman"/>
+            </a:endParaRPr>
           </a:p>
         </p:txBody>
       </p:sp>
@@ -5491,17 +5941,23 @@
         </p:nvSpPr>
         <p:spPr/>
         <p:txBody>
-          <a:bodyPr/>
+          <a:bodyPr>
+            <a:normAutofit fontScale="90000"/>
+          </a:bodyPr>
           <a:lstStyle/>
           <a:p>
             <a:pPr algn="l"/>
             <a:r>
               <a:rPr lang="en-US" dirty="0" smtClean="0">
-                <a:cs typeface="+mj-cs"/>
+                <a:latin typeface="Times New Roman"/>
+                <a:cs typeface="Times New Roman"/>
               </a:rPr>
               <a:t>Limitations of DSSR strategy</a:t>
             </a:r>
-            <a:endParaRPr lang="en-US" dirty="0"/>
+            <a:endParaRPr lang="en-US" dirty="0">
+              <a:latin typeface="Times New Roman"/>
+              <a:cs typeface="Times New Roman"/>
+            </a:endParaRPr>
           </a:p>
         </p:txBody>
       </p:sp>
@@ -5526,8 +5982,25 @@
               <a:defRPr/>
             </a:pPr>
             <a:r>
-              <a:rPr lang="en-US" sz="2800" dirty="0"/>
-              <a:t>Lake of improvement for point fault domain</a:t>
+              <a:rPr lang="en-US" sz="2800" dirty="0">
+                <a:latin typeface="Times New Roman"/>
+                <a:cs typeface="Times New Roman"/>
+              </a:rPr>
+              <a:t>Lake </a:t>
+            </a:r>
+            <a:r>
+              <a:rPr lang="en-US" sz="2800" dirty="0">
+                <a:latin typeface="Times New Roman"/>
+                <a:cs typeface="Times New Roman"/>
+              </a:rPr>
+              <a:t>of</a:t>
+            </a:r>
+            <a:r>
+              <a:rPr lang="en-US" sz="2800" dirty="0">
+                <a:latin typeface="Times New Roman"/>
+                <a:cs typeface="Times New Roman"/>
+              </a:rPr>
+              <a:t> improvement for point fault domain</a:t>
             </a:r>
           </a:p>
           <a:p>
@@ -5535,7 +6008,10 @@
               <a:defRPr/>
             </a:pPr>
             <a:r>
-              <a:rPr lang="en-US" sz="2800" dirty="0"/>
+              <a:rPr lang="en-US" sz="2800" dirty="0">
+                <a:latin typeface="Times New Roman"/>
+                <a:cs typeface="Times New Roman"/>
+              </a:rPr>
               <a:t>Excess time involved to find first fault</a:t>
             </a:r>
           </a:p>
@@ -5544,14 +6020,23 @@
               <a:defRPr/>
             </a:pPr>
             <a:r>
-              <a:rPr lang="en-US" sz="2800" dirty="0"/>
+              <a:rPr lang="en-US" sz="2800" dirty="0">
+                <a:latin typeface="Times New Roman"/>
+                <a:cs typeface="Times New Roman"/>
+              </a:rPr>
               <a:t>5% over-head than R and 2% than R</a:t>
             </a:r>
             <a:r>
-              <a:rPr lang="en-US" sz="2800" dirty="0" smtClean="0"/>
+              <a:rPr lang="en-US" sz="2800" dirty="0" smtClean="0">
+                <a:latin typeface="Times New Roman"/>
+                <a:cs typeface="Times New Roman"/>
+              </a:rPr>
               <a:t>+</a:t>
             </a:r>
-            <a:endParaRPr lang="en-US" sz="2800" dirty="0"/>
+            <a:endParaRPr lang="en-US" sz="2800" dirty="0">
+              <a:latin typeface="Times New Roman"/>
+              <a:cs typeface="Times New Roman"/>
+            </a:endParaRPr>
           </a:p>
         </p:txBody>
       </p:sp>
@@ -5611,10 +6096,16 @@
           <a:p>
             <a:pPr algn="l"/>
             <a:r>
-              <a:rPr lang="en-US" dirty="0" smtClean="0"/>
+              <a:rPr lang="en-US" dirty="0" smtClean="0">
+                <a:latin typeface="Times New Roman"/>
+                <a:cs typeface="Times New Roman"/>
+              </a:rPr>
               <a:t>Development of new improved strategy </a:t>
             </a:r>
-            <a:endParaRPr lang="en-US" dirty="0"/>
+            <a:endParaRPr lang="en-US" dirty="0">
+              <a:latin typeface="Times New Roman"/>
+              <a:cs typeface="Times New Roman"/>
+            </a:endParaRPr>
           </a:p>
         </p:txBody>
       </p:sp>
@@ -5637,7 +6128,10 @@
               <a:defRPr/>
             </a:pPr>
             <a:r>
-              <a:rPr lang="en-US" sz="2800" dirty="0"/>
+              <a:rPr lang="en-US" sz="2800" dirty="0">
+                <a:latin typeface="Times New Roman"/>
+                <a:cs typeface="Times New Roman"/>
+              </a:rPr>
               <a:t>Salient Features</a:t>
             </a:r>
           </a:p>
@@ -5646,7 +6140,10 @@
               <a:defRPr/>
             </a:pPr>
             <a:r>
-              <a:rPr lang="en-US" sz="2400" dirty="0"/>
+              <a:rPr lang="en-US" sz="2400" dirty="0">
+                <a:latin typeface="Times New Roman"/>
+                <a:cs typeface="Times New Roman"/>
+              </a:rPr>
               <a:t>Automated Method</a:t>
             </a:r>
           </a:p>
@@ -5655,7 +6152,10 @@
               <a:defRPr/>
             </a:pPr>
             <a:r>
-              <a:rPr lang="en-US" sz="2400" dirty="0"/>
+              <a:rPr lang="en-US" sz="2400" dirty="0">
+                <a:latin typeface="Times New Roman"/>
+                <a:cs typeface="Times New Roman"/>
+              </a:rPr>
               <a:t>Find finding ability </a:t>
             </a:r>
           </a:p>
@@ -5664,7 +6164,10 @@
               <a:defRPr/>
             </a:pPr>
             <a:r>
-              <a:rPr lang="en-US" sz="2400" dirty="0"/>
+              <a:rPr lang="en-US" sz="2400" dirty="0">
+                <a:latin typeface="Times New Roman"/>
+                <a:cs typeface="Times New Roman"/>
+              </a:rPr>
               <a:t>Fault Domain finding ability</a:t>
             </a:r>
           </a:p>
@@ -5673,12 +6176,18 @@
               <a:defRPr/>
             </a:pPr>
             <a:r>
-              <a:rPr lang="en-US" sz="2400" dirty="0"/>
+              <a:rPr lang="en-US" sz="2400" dirty="0">
+                <a:latin typeface="Times New Roman"/>
+                <a:cs typeface="Times New Roman"/>
+              </a:rPr>
               <a:t>Plot Domain Graphing ability</a:t>
             </a:r>
           </a:p>
           <a:p>
-            <a:endParaRPr lang="en-US" dirty="0"/>
+            <a:endParaRPr lang="en-US" dirty="0">
+              <a:latin typeface="Times New Roman"/>
+              <a:cs typeface="Times New Roman"/>
+            </a:endParaRPr>
           </a:p>
         </p:txBody>
       </p:sp>
@@ -5738,10 +6247,16 @@
           <a:p>
             <a:pPr algn="l"/>
             <a:r>
-              <a:rPr lang="en-US" dirty="0" smtClean="0"/>
+              <a:rPr lang="en-US" dirty="0" smtClean="0">
+                <a:latin typeface="Times New Roman"/>
+                <a:cs typeface="Times New Roman"/>
+              </a:rPr>
               <a:t>Development of DSSR with Daikon strategy</a:t>
             </a:r>
-            <a:endParaRPr lang="en-US" dirty="0"/>
+            <a:endParaRPr lang="en-US" dirty="0">
+              <a:latin typeface="Times New Roman"/>
+              <a:cs typeface="Times New Roman"/>
+            </a:endParaRPr>
           </a:p>
         </p:txBody>
       </p:sp>
@@ -5766,7 +6281,10 @@
               <a:defRPr/>
             </a:pPr>
             <a:r>
-              <a:rPr lang="en-US" sz="2800" dirty="0"/>
+              <a:rPr lang="en-US" sz="2800" dirty="0">
+                <a:latin typeface="Times New Roman"/>
+                <a:cs typeface="Times New Roman"/>
+              </a:rPr>
               <a:t>Salient Features</a:t>
             </a:r>
           </a:p>
@@ -5775,7 +6293,10 @@
               <a:defRPr/>
             </a:pPr>
             <a:r>
-              <a:rPr lang="en-US" sz="2400" dirty="0"/>
+              <a:rPr lang="en-US" sz="2400" dirty="0">
+                <a:latin typeface="Times New Roman"/>
+                <a:cs typeface="Times New Roman"/>
+              </a:rPr>
               <a:t>Capability to execute SUT by Daikon to generate invariants</a:t>
             </a:r>
           </a:p>
@@ -5784,7 +6305,10 @@
               <a:defRPr/>
             </a:pPr>
             <a:r>
-              <a:rPr lang="en-US" sz="2400" dirty="0"/>
+              <a:rPr lang="en-US" sz="2400" dirty="0">
+                <a:latin typeface="Times New Roman"/>
+                <a:cs typeface="Times New Roman"/>
+              </a:rPr>
               <a:t>Capability to add data to the list of interesting values from invariants</a:t>
             </a:r>
           </a:p>
@@ -5793,12 +6317,18 @@
               <a:defRPr/>
             </a:pPr>
             <a:r>
-              <a:rPr lang="en-US" sz="2400" dirty="0"/>
+              <a:rPr lang="en-US" sz="2400" dirty="0">
+                <a:latin typeface="Times New Roman"/>
+                <a:cs typeface="Times New Roman"/>
+              </a:rPr>
               <a:t>Capability to Execute DSSR strategy at this stage </a:t>
             </a:r>
           </a:p>
           <a:p>
-            <a:endParaRPr lang="en-US" dirty="0"/>
+            <a:endParaRPr lang="en-US" dirty="0">
+              <a:latin typeface="Times New Roman"/>
+              <a:cs typeface="Times New Roman"/>
+            </a:endParaRPr>
           </a:p>
         </p:txBody>
       </p:sp>
@@ -5858,11 +6388,15 @@
           <a:p>
             <a:r>
               <a:rPr lang="en-US" dirty="0" smtClean="0">
-                <a:cs typeface="+mj-cs"/>
+                <a:latin typeface="Times New Roman"/>
+                <a:cs typeface="Times New Roman"/>
               </a:rPr>
               <a:t>Steps of Testing SUT by ADFD strategy</a:t>
             </a:r>
-            <a:endParaRPr lang="en-US" dirty="0"/>
+            <a:endParaRPr lang="en-US" dirty="0">
+              <a:latin typeface="Times New Roman"/>
+              <a:cs typeface="Times New Roman"/>
+            </a:endParaRPr>
           </a:p>
         </p:txBody>
       </p:sp>
@@ -5887,7 +6421,10 @@
               <a:defRPr/>
             </a:pPr>
             <a:r>
-              <a:rPr lang="en-US" sz="2800" dirty="0"/>
+              <a:rPr lang="en-US" sz="2800" dirty="0">
+                <a:latin typeface="Times New Roman"/>
+                <a:cs typeface="Times New Roman"/>
+              </a:rPr>
               <a:t>Starts Testing of SUT</a:t>
             </a:r>
           </a:p>
@@ -5896,7 +6433,10 @@
               <a:defRPr/>
             </a:pPr>
             <a:r>
-              <a:rPr lang="en-US" sz="2800" dirty="0"/>
+              <a:rPr lang="en-US" sz="2800" dirty="0">
+                <a:latin typeface="Times New Roman"/>
+                <a:cs typeface="Times New Roman"/>
+              </a:rPr>
               <a:t>Finds Fault</a:t>
             </a:r>
           </a:p>
@@ -5905,7 +6445,10 @@
               <a:defRPr/>
             </a:pPr>
             <a:r>
-              <a:rPr lang="en-US" sz="2800" dirty="0"/>
+              <a:rPr lang="en-US" sz="2800" dirty="0">
+                <a:latin typeface="Times New Roman"/>
+                <a:cs typeface="Times New Roman"/>
+              </a:rPr>
               <a:t>Generates program Dynamically</a:t>
             </a:r>
           </a:p>
@@ -5914,7 +6457,10 @@
               <a:defRPr/>
             </a:pPr>
             <a:r>
-              <a:rPr lang="en-US" sz="2800" dirty="0"/>
+              <a:rPr lang="en-US" sz="2800" dirty="0">
+                <a:latin typeface="Times New Roman"/>
+                <a:cs typeface="Times New Roman"/>
+              </a:rPr>
               <a:t>Compiles the program</a:t>
             </a:r>
           </a:p>
@@ -5923,7 +6469,10 @@
               <a:defRPr/>
             </a:pPr>
             <a:r>
-              <a:rPr lang="en-US" sz="2800" dirty="0"/>
+              <a:rPr lang="en-US" sz="2800" dirty="0">
+                <a:latin typeface="Times New Roman"/>
+                <a:cs typeface="Times New Roman"/>
+              </a:rPr>
               <a:t>Executes the program</a:t>
             </a:r>
           </a:p>
@@ -5932,7 +6481,10 @@
               <a:defRPr/>
             </a:pPr>
             <a:r>
-              <a:rPr lang="en-US" sz="2800" dirty="0"/>
+              <a:rPr lang="en-US" sz="2800" dirty="0">
+                <a:latin typeface="Times New Roman"/>
+                <a:cs typeface="Times New Roman"/>
+              </a:rPr>
               <a:t>Generates data</a:t>
             </a:r>
           </a:p>
@@ -5941,17 +6493,29 @@
               <a:defRPr/>
             </a:pPr>
             <a:r>
-              <a:rPr lang="en-US" sz="2800" dirty="0"/>
+              <a:rPr lang="en-US" sz="2800" dirty="0">
+                <a:latin typeface="Times New Roman"/>
+                <a:cs typeface="Times New Roman"/>
+              </a:rPr>
               <a:t>Presents data in Graphical </a:t>
             </a:r>
             <a:br>
-              <a:rPr lang="en-US" sz="2800" dirty="0"/>
+              <a:rPr lang="en-US" sz="2800" dirty="0">
+                <a:latin typeface="Times New Roman"/>
+                <a:cs typeface="Times New Roman"/>
+              </a:rPr>
             </a:br>
             <a:r>
-              <a:rPr lang="en-US" sz="2800" dirty="0" smtClean="0"/>
+              <a:rPr lang="en-US" sz="2800" dirty="0" smtClean="0">
+                <a:latin typeface="Times New Roman"/>
+                <a:cs typeface="Times New Roman"/>
+              </a:rPr>
               <a:t>format</a:t>
             </a:r>
-            <a:endParaRPr lang="en-US" sz="2800" dirty="0"/>
+            <a:endParaRPr lang="en-US" sz="2800" dirty="0">
+              <a:latin typeface="Times New Roman"/>
+              <a:cs typeface="Times New Roman"/>
+            </a:endParaRPr>
           </a:p>
         </p:txBody>
       </p:sp>
@@ -6066,10 +6630,16 @@
           <a:lstStyle/>
           <a:p>
             <a:r>
-              <a:rPr lang="en-US" dirty="0" smtClean="0"/>
+              <a:rPr lang="en-US" dirty="0" smtClean="0">
+                <a:latin typeface="Times New Roman"/>
+                <a:cs typeface="Times New Roman"/>
+              </a:rPr>
               <a:t>Example to illustrate working of ADFD strategy</a:t>
             </a:r>
-            <a:endParaRPr lang="en-US" dirty="0"/>
+            <a:endParaRPr lang="en-US" dirty="0">
+              <a:latin typeface="Times New Roman"/>
+              <a:cs typeface="Times New Roman"/>
+            </a:endParaRPr>
           </a:p>
         </p:txBody>
       </p:sp>
@@ -6148,20 +6718,20 @@
               <a:buNone/>
             </a:pPr>
             <a:r>
-              <a:rPr lang="en-US" dirty="0" smtClean="0">
+              <a:rPr lang="en-US" sz="2800" dirty="0" smtClean="0">
                 <a:latin typeface="Times New Roman"/>
                 <a:cs typeface="Times New Roman"/>
               </a:rPr>
               <a:t>Development of new automated </a:t>
             </a:r>
             <a:br>
-              <a:rPr lang="en-US" dirty="0" smtClean="0">
+              <a:rPr lang="en-US" sz="2800" dirty="0" smtClean="0">
                 <a:latin typeface="Times New Roman"/>
                 <a:cs typeface="Times New Roman"/>
               </a:rPr>
             </a:br>
             <a:r>
-              <a:rPr lang="en-US" dirty="0" smtClean="0">
+              <a:rPr lang="en-US" sz="2800" dirty="0" smtClean="0">
                 <a:latin typeface="Times New Roman"/>
                 <a:cs typeface="Times New Roman"/>
               </a:rPr>
@@ -6319,6 +6889,41 @@
           </a:extLst>
         </p:spPr>
       </p:pic>
+      <p:sp>
+        <p:nvSpPr>
+          <p:cNvPr id="5" name="Title 1"/>
+          <p:cNvSpPr>
+            <a:spLocks noGrp="1"/>
+          </p:cNvSpPr>
+          <p:nvPr>
+            <p:ph type="title"/>
+          </p:nvPr>
+        </p:nvSpPr>
+        <p:spPr>
+          <a:xfrm>
+            <a:off x="457200" y="274638"/>
+            <a:ext cx="8229600" cy="1143000"/>
+          </a:xfrm>
+        </p:spPr>
+        <p:txBody>
+          <a:bodyPr/>
+          <a:lstStyle/>
+          <a:p>
+            <a:pPr algn="l"/>
+            <a:r>
+              <a:rPr lang="en-US" dirty="0" smtClean="0">
+                <a:latin typeface="Times New Roman"/>
+                <a:cs typeface="Times New Roman"/>
+              </a:rPr>
+              <a:t>Objectives</a:t>
+            </a:r>
+            <a:endParaRPr lang="en-US" dirty="0">
+              <a:latin typeface="Times New Roman"/>
+              <a:cs typeface="Times New Roman"/>
+            </a:endParaRPr>
+          </a:p>
+        </p:txBody>
+      </p:sp>
     </p:spTree>
     <p:extLst>
       <p:ext uri="{BB962C8B-B14F-4D97-AF65-F5344CB8AC3E}">
@@ -6368,16 +6973,22 @@
         </p:nvSpPr>
         <p:spPr/>
         <p:txBody>
-          <a:bodyPr/>
+          <a:bodyPr>
+            <a:normAutofit/>
+          </a:bodyPr>
           <a:lstStyle/>
           <a:p>
             <a:r>
               <a:rPr lang="en-US" dirty="0" smtClean="0">
-                <a:cs typeface="+mj-cs"/>
+                <a:latin typeface="Times New Roman"/>
+                <a:cs typeface="Times New Roman"/>
               </a:rPr>
               <a:t>Searching for Fault Patterns</a:t>
             </a:r>
-            <a:endParaRPr lang="en-US" dirty="0"/>
+            <a:endParaRPr lang="en-US" dirty="0">
+              <a:latin typeface="Times New Roman"/>
+              <a:cs typeface="Times New Roman"/>
+            </a:endParaRPr>
           </a:p>
         </p:txBody>
       </p:sp>
@@ -6393,10 +7004,15 @@
         </p:nvSpPr>
         <p:spPr/>
         <p:txBody>
-          <a:bodyPr/>
+          <a:bodyPr>
+            <a:normAutofit/>
+          </a:bodyPr>
           <a:lstStyle/>
           <a:p>
-            <a:endParaRPr lang="en-US"/>
+            <a:endParaRPr lang="en-US" sz="2800" dirty="0">
+              <a:latin typeface="Times New Roman"/>
+              <a:cs typeface="Times New Roman"/>
+            </a:endParaRPr>
           </a:p>
         </p:txBody>
       </p:sp>
@@ -6449,36 +7065,35 @@
         </p:nvSpPr>
         <p:spPr>
           <a:xfrm>
-            <a:off x="284869" y="1202943"/>
-            <a:ext cx="8401931" cy="4922073"/>
+            <a:off x="516194" y="1202943"/>
+            <a:ext cx="8170606" cy="4922073"/>
           </a:xfrm>
         </p:spPr>
         <p:txBody>
           <a:bodyPr>
-            <a:normAutofit lnSpcReduction="10000"/>
+            <a:normAutofit/>
           </a:bodyPr>
           <a:lstStyle/>
           <a:p>
             <a:pPr marL="0" indent="0">
-              <a:buFontTx/>
               <a:buNone/>
               <a:defRPr/>
             </a:pPr>
             <a:r>
-              <a:rPr lang="en-US" dirty="0">
+              <a:rPr lang="en-US" sz="2800" dirty="0">
                 <a:latin typeface="Times New Roman"/>
                 <a:cs typeface="Times New Roman"/>
               </a:rPr>
               <a:t>Dirt Spot Sweeping Random </a:t>
             </a:r>
             <a:r>
-              <a:rPr lang="en-US" dirty="0" smtClean="0">
+              <a:rPr lang="en-US" sz="2800" dirty="0">
                 <a:latin typeface="Times New Roman"/>
                 <a:cs typeface="Times New Roman"/>
               </a:rPr>
               <a:t>Strategy</a:t>
             </a:r>
-            <a:endParaRPr lang="en-US" dirty="0">
+            <a:endParaRPr lang="en-US" sz="2800" dirty="0">
               <a:latin typeface="Times New Roman"/>
               <a:cs typeface="Times New Roman"/>
             </a:endParaRPr>
@@ -6526,23 +7141,15 @@
           </a:p>
           <a:p>
             <a:pPr marL="0" indent="0">
-              <a:buFontTx/>
               <a:buNone/>
               <a:defRPr/>
             </a:pPr>
             <a:r>
-              <a:rPr lang="en-US" dirty="0">
-                <a:latin typeface="Times New Roman"/>
-                <a:cs typeface="Times New Roman"/>
-              </a:rPr>
-              <a:t>Automated Discovery of Failure </a:t>
-            </a:r>
-            <a:r>
-              <a:rPr lang="en-US" dirty="0" smtClean="0">
-                <a:latin typeface="Times New Roman"/>
-                <a:cs typeface="Times New Roman"/>
-              </a:rPr>
-              <a:t>Domain Strategy</a:t>
+              <a:rPr lang="en-US" sz="2800" dirty="0">
+                <a:latin typeface="Times New Roman"/>
+                <a:cs typeface="Times New Roman"/>
+              </a:rPr>
+              <a:t>Automated Discovery of Failure Domain Strategy</a:t>
             </a:r>
           </a:p>
           <a:p>
@@ -6595,28 +7202,16 @@
           </a:p>
           <a:p>
             <a:pPr marL="0" indent="0">
-              <a:buFontTx/>
               <a:buNone/>
               <a:defRPr/>
             </a:pPr>
             <a:r>
-              <a:rPr lang="en-US" dirty="0">
-                <a:latin typeface="Times New Roman"/>
-                <a:cs typeface="Times New Roman"/>
-              </a:rPr>
-              <a:t>DSSR with Daikon </a:t>
-            </a:r>
-            <a:r>
-              <a:rPr lang="en-US" dirty="0" smtClean="0">
-                <a:latin typeface="Times New Roman"/>
-                <a:cs typeface="Times New Roman"/>
-              </a:rPr>
-              <a:t>Strategy</a:t>
-            </a:r>
-            <a:endParaRPr lang="en-US" dirty="0">
-              <a:latin typeface="Times New Roman"/>
-              <a:cs typeface="Times New Roman"/>
-            </a:endParaRPr>
+              <a:rPr lang="en-US" sz="2800" dirty="0">
+                <a:latin typeface="Times New Roman"/>
+                <a:cs typeface="Times New Roman"/>
+              </a:rPr>
+              <a:t>DSSR with Daikon Strategy</a:t>
+            </a:r>
           </a:p>
           <a:p>
             <a:pPr lvl="1">
@@ -6704,6 +7299,41 @@
           </a:extLst>
         </p:spPr>
       </p:pic>
+      <p:sp>
+        <p:nvSpPr>
+          <p:cNvPr id="6" name="Title 1"/>
+          <p:cNvSpPr>
+            <a:spLocks noGrp="1"/>
+          </p:cNvSpPr>
+          <p:nvPr>
+            <p:ph type="title"/>
+          </p:nvPr>
+        </p:nvSpPr>
+        <p:spPr>
+          <a:xfrm>
+            <a:off x="457200" y="274638"/>
+            <a:ext cx="8229600" cy="1143000"/>
+          </a:xfrm>
+        </p:spPr>
+        <p:txBody>
+          <a:bodyPr/>
+          <a:lstStyle/>
+          <a:p>
+            <a:pPr algn="l"/>
+            <a:r>
+              <a:rPr lang="en-US" dirty="0" smtClean="0">
+                <a:latin typeface="Times New Roman"/>
+                <a:cs typeface="Times New Roman"/>
+              </a:rPr>
+              <a:t>Achievements</a:t>
+            </a:r>
+            <a:endParaRPr lang="en-US" dirty="0">
+              <a:latin typeface="Times New Roman"/>
+              <a:cs typeface="Times New Roman"/>
+            </a:endParaRPr>
+          </a:p>
+        </p:txBody>
+      </p:sp>
     </p:spTree>
     <p:extLst>
       <p:ext uri="{BB962C8B-B14F-4D97-AF65-F5344CB8AC3E}">
@@ -6758,10 +7388,16 @@
           <a:p>
             <a:pPr algn="l"/>
             <a:r>
-              <a:rPr lang="en-US" dirty="0" smtClean="0"/>
+              <a:rPr lang="en-US" dirty="0" smtClean="0">
+                <a:latin typeface="Times New Roman"/>
+                <a:cs typeface="Times New Roman"/>
+              </a:rPr>
               <a:t>Why random testing?</a:t>
             </a:r>
-            <a:endParaRPr lang="en-US" dirty="0"/>
+            <a:endParaRPr lang="en-US" dirty="0">
+              <a:latin typeface="Times New Roman"/>
+              <a:cs typeface="Times New Roman"/>
+            </a:endParaRPr>
           </a:p>
         </p:txBody>
       </p:sp>
@@ -6786,8 +7422,25 @@
               <a:defRPr/>
             </a:pPr>
             <a:r>
-              <a:rPr lang="en-US" sz="2800" dirty="0"/>
-              <a:t>Testing of all values is impossible</a:t>
+              <a:rPr lang="en-US" sz="2800" dirty="0">
+                <a:latin typeface="Times New Roman"/>
+                <a:cs typeface="Times New Roman"/>
+              </a:rPr>
+              <a:t>Testing of all </a:t>
+            </a:r>
+            <a:r>
+              <a:rPr lang="en-US" sz="2800" dirty="0">
+                <a:latin typeface="Times New Roman"/>
+                <a:cs typeface="Times New Roman"/>
+              </a:rPr>
+              <a:t>values</a:t>
+            </a:r>
+            <a:r>
+              <a:rPr lang="en-US" sz="2800" dirty="0">
+                <a:latin typeface="Times New Roman"/>
+                <a:cs typeface="Times New Roman"/>
+              </a:rPr>
+              <a:t> is impossible</a:t>
             </a:r>
           </a:p>
           <a:p>
@@ -6795,7 +7448,10 @@
               <a:defRPr/>
             </a:pPr>
             <a:r>
-              <a:rPr lang="en-US" sz="2800" dirty="0"/>
+              <a:rPr lang="en-US" sz="2800" dirty="0">
+                <a:latin typeface="Times New Roman"/>
+                <a:cs typeface="Times New Roman"/>
+              </a:rPr>
               <a:t>Limited Time and Resources</a:t>
             </a:r>
           </a:p>
@@ -6804,7 +7460,10 @@
               <a:defRPr/>
             </a:pPr>
             <a:r>
-              <a:rPr lang="en-US" sz="2800" dirty="0"/>
+              <a:rPr lang="en-US" sz="2800" dirty="0">
+                <a:latin typeface="Times New Roman"/>
+                <a:cs typeface="Times New Roman"/>
+              </a:rPr>
               <a:t>Simple but practical selection approach</a:t>
             </a:r>
           </a:p>
@@ -6813,8 +7472,18 @@
               <a:defRPr/>
             </a:pPr>
             <a:r>
-              <a:rPr lang="en-US" sz="2800" dirty="0"/>
-              <a:t>Easy implementation</a:t>
+              <a:rPr lang="en-US" sz="2800" dirty="0">
+                <a:latin typeface="Times New Roman"/>
+                <a:cs typeface="Times New Roman"/>
+              </a:rPr>
+              <a:t>Easy </a:t>
+            </a:r>
+            <a:r>
+              <a:rPr lang="en-US" sz="2800" dirty="0">
+                <a:latin typeface="Times New Roman"/>
+                <a:cs typeface="Times New Roman"/>
+              </a:rPr>
+              <a:t>implementation</a:t>
             </a:r>
           </a:p>
           <a:p>
@@ -6822,7 +7491,10 @@
               <a:defRPr/>
             </a:pPr>
             <a:r>
-              <a:rPr lang="en-US" sz="2800" dirty="0"/>
+              <a:rPr lang="en-US" sz="2800" dirty="0">
+                <a:latin typeface="Times New Roman"/>
+                <a:cs typeface="Times New Roman"/>
+              </a:rPr>
               <a:t>Free from human bias</a:t>
             </a:r>
           </a:p>
@@ -6831,7 +7503,10 @@
               <a:defRPr/>
             </a:pPr>
             <a:r>
-              <a:rPr lang="en-US" sz="2800" dirty="0"/>
+              <a:rPr lang="en-US" sz="2800" dirty="0">
+                <a:latin typeface="Times New Roman"/>
+                <a:cs typeface="Times New Roman"/>
+              </a:rPr>
               <a:t>Quick and effective in finding faults</a:t>
             </a:r>
           </a:p>
@@ -6840,14 +7515,23 @@
               <a:defRPr/>
             </a:pPr>
             <a:r>
-              <a:rPr lang="en-US" sz="2800" dirty="0"/>
+              <a:rPr lang="en-US" sz="2800" dirty="0">
+                <a:latin typeface="Times New Roman"/>
+                <a:cs typeface="Times New Roman"/>
+              </a:rPr>
               <a:t>Code </a:t>
             </a:r>
             <a:r>
-              <a:rPr lang="en-US" sz="2800" dirty="0" smtClean="0"/>
+              <a:rPr lang="en-US" sz="2800" dirty="0" smtClean="0">
+                <a:latin typeface="Times New Roman"/>
+                <a:cs typeface="Times New Roman"/>
+              </a:rPr>
               <a:t>Privacy</a:t>
             </a:r>
-            <a:endParaRPr lang="en-US" sz="2800" dirty="0"/>
+            <a:endParaRPr lang="en-US" sz="2800" dirty="0">
+              <a:latin typeface="Times New Roman"/>
+              <a:cs typeface="Times New Roman"/>
+            </a:endParaRPr>
           </a:p>
         </p:txBody>
       </p:sp>
@@ -6960,11 +7644,15 @@
             <a:pPr algn="l"/>
             <a:r>
               <a:rPr lang="en-US" dirty="0" smtClean="0">
-                <a:cs typeface="+mj-cs"/>
+                <a:latin typeface="Times New Roman"/>
+                <a:cs typeface="Times New Roman"/>
               </a:rPr>
               <a:t>What is Random Testing</a:t>
             </a:r>
-            <a:endParaRPr lang="en-US" dirty="0"/>
+            <a:endParaRPr lang="en-US" dirty="0">
+              <a:latin typeface="Times New Roman"/>
+              <a:cs typeface="Times New Roman"/>
+            </a:endParaRPr>
           </a:p>
         </p:txBody>
       </p:sp>
@@ -6989,8 +7677,25 @@
               <a:defRPr/>
             </a:pPr>
             <a:r>
-              <a:rPr lang="en-US" sz="2800" dirty="0"/>
-              <a:t>Black-box testing technique</a:t>
+              <a:rPr lang="en-US" sz="2800" dirty="0">
+                <a:latin typeface="Times New Roman"/>
+                <a:cs typeface="Times New Roman"/>
+              </a:rPr>
+              <a:t>Black-box </a:t>
+            </a:r>
+            <a:r>
+              <a:rPr lang="en-US" sz="2800" dirty="0">
+                <a:latin typeface="Times New Roman"/>
+                <a:cs typeface="Times New Roman"/>
+              </a:rPr>
+              <a:t>testing</a:t>
+            </a:r>
+            <a:r>
+              <a:rPr lang="en-US" sz="2800" dirty="0">
+                <a:latin typeface="Times New Roman"/>
+                <a:cs typeface="Times New Roman"/>
+              </a:rPr>
+              <a:t> technique</a:t>
             </a:r>
           </a:p>
           <a:p>
@@ -6998,8 +7703,25 @@
               <a:defRPr/>
             </a:pPr>
             <a:r>
-              <a:rPr lang="en-US" sz="2800" dirty="0"/>
-              <a:t>Dynamic testing process</a:t>
+              <a:rPr lang="en-US" sz="2800" dirty="0">
+                <a:latin typeface="Times New Roman"/>
+                <a:cs typeface="Times New Roman"/>
+              </a:rPr>
+              <a:t>Dynamic </a:t>
+            </a:r>
+            <a:r>
+              <a:rPr lang="en-US" sz="2800" dirty="0">
+                <a:latin typeface="Times New Roman"/>
+                <a:cs typeface="Times New Roman"/>
+              </a:rPr>
+              <a:t>testing</a:t>
+            </a:r>
+            <a:r>
+              <a:rPr lang="en-US" sz="2800" dirty="0">
+                <a:latin typeface="Times New Roman"/>
+                <a:cs typeface="Times New Roman"/>
+              </a:rPr>
+              <a:t> process</a:t>
             </a:r>
           </a:p>
           <a:p>
@@ -7007,7 +7729,10 @@
               <a:defRPr/>
             </a:pPr>
             <a:r>
-              <a:rPr lang="en-US" sz="2800" dirty="0"/>
+              <a:rPr lang="en-US" sz="2800" dirty="0">
+                <a:latin typeface="Times New Roman"/>
+                <a:cs typeface="Times New Roman"/>
+              </a:rPr>
               <a:t>Input Domain</a:t>
             </a:r>
           </a:p>
@@ -7016,7 +7741,10 @@
               <a:defRPr/>
             </a:pPr>
             <a:r>
-              <a:rPr lang="en-US" sz="2800" dirty="0"/>
+              <a:rPr lang="en-US" sz="2800" dirty="0">
+                <a:latin typeface="Times New Roman"/>
+                <a:cs typeface="Times New Roman"/>
+              </a:rPr>
               <a:t>Random Selection</a:t>
             </a:r>
           </a:p>
@@ -7025,8 +7753,18 @@
               <a:defRPr/>
             </a:pPr>
             <a:r>
-              <a:rPr lang="en-US" sz="2800" dirty="0"/>
-              <a:t>Test Execution</a:t>
+              <a:rPr lang="en-US" sz="2800" dirty="0">
+                <a:latin typeface="Times New Roman"/>
+                <a:cs typeface="Times New Roman"/>
+              </a:rPr>
+              <a:t>Test </a:t>
+            </a:r>
+            <a:r>
+              <a:rPr lang="en-US" sz="2800" dirty="0">
+                <a:latin typeface="Times New Roman"/>
+                <a:cs typeface="Times New Roman"/>
+              </a:rPr>
+              <a:t>Execution</a:t>
             </a:r>
           </a:p>
           <a:p>
@@ -7034,8 +7772,18 @@
               <a:defRPr/>
             </a:pPr>
             <a:r>
-              <a:rPr lang="en-US" sz="2800" dirty="0"/>
-              <a:t>Test Evaluation</a:t>
+              <a:rPr lang="en-US" sz="2800" dirty="0">
+                <a:latin typeface="Times New Roman"/>
+                <a:cs typeface="Times New Roman"/>
+              </a:rPr>
+              <a:t>Test </a:t>
+            </a:r>
+            <a:r>
+              <a:rPr lang="en-US" sz="2800" dirty="0">
+                <a:latin typeface="Times New Roman"/>
+                <a:cs typeface="Times New Roman"/>
+              </a:rPr>
+              <a:t>Evaluation</a:t>
             </a:r>
           </a:p>
           <a:p>
@@ -7043,7 +7791,10 @@
               <a:defRPr/>
             </a:pPr>
             <a:r>
-              <a:rPr lang="en-US" sz="2800" dirty="0"/>
+              <a:rPr lang="en-US" sz="2800" dirty="0">
+                <a:latin typeface="Times New Roman"/>
+                <a:cs typeface="Times New Roman"/>
+              </a:rPr>
               <a:t>Test Output </a:t>
             </a:r>
           </a:p>
@@ -7158,11 +7909,15 @@
             <a:pPr algn="l"/>
             <a:r>
               <a:rPr lang="en-US" dirty="0" smtClean="0">
-                <a:cs typeface="+mj-cs"/>
+                <a:latin typeface="Times New Roman"/>
+                <a:cs typeface="Times New Roman"/>
               </a:rPr>
               <a:t>Automated Random Testing</a:t>
             </a:r>
-            <a:endParaRPr lang="en-US" dirty="0"/>
+            <a:endParaRPr lang="en-US" dirty="0">
+              <a:latin typeface="Times New Roman"/>
+              <a:cs typeface="Times New Roman"/>
+            </a:endParaRPr>
           </a:p>
         </p:txBody>
       </p:sp>
@@ -7185,7 +7940,10 @@
               <a:defRPr/>
             </a:pPr>
             <a:r>
-              <a:rPr lang="en-US" sz="2800" dirty="0"/>
+              <a:rPr lang="en-US" sz="2800" dirty="0">
+                <a:latin typeface="Times New Roman"/>
+                <a:cs typeface="Times New Roman"/>
+              </a:rPr>
               <a:t>Automating the process of random testing </a:t>
             </a:r>
           </a:p>
@@ -7194,7 +7952,10 @@
               <a:defRPr/>
             </a:pPr>
             <a:r>
-              <a:rPr lang="en-US" sz="2800" dirty="0"/>
+              <a:rPr lang="en-US" sz="2800" dirty="0">
+                <a:latin typeface="Times New Roman"/>
+                <a:cs typeface="Times New Roman"/>
+              </a:rPr>
               <a:t>Automated Random Testing Tools:</a:t>
             </a:r>
           </a:p>
@@ -7203,7 +7964,10 @@
               <a:defRPr/>
             </a:pPr>
             <a:r>
-              <a:rPr lang="en-US" sz="2400" dirty="0"/>
+              <a:rPr lang="en-US" sz="2400" dirty="0">
+                <a:latin typeface="Times New Roman"/>
+                <a:cs typeface="Times New Roman"/>
+              </a:rPr>
               <a:t>YETI</a:t>
             </a:r>
           </a:p>
@@ -7212,33 +7976,54 @@
               <a:defRPr/>
             </a:pPr>
             <a:r>
-              <a:rPr lang="en-US" sz="2400" dirty="0" err="1"/>
+              <a:rPr lang="en-US" sz="2400" dirty="0" err="1">
+                <a:latin typeface="Times New Roman"/>
+                <a:cs typeface="Times New Roman"/>
+              </a:rPr>
               <a:t>JCrasher</a:t>
             </a:r>
-            <a:endParaRPr lang="en-US" sz="2400" dirty="0"/>
+            <a:endParaRPr lang="en-US" sz="2400" dirty="0">
+              <a:latin typeface="Times New Roman"/>
+              <a:cs typeface="Times New Roman"/>
+            </a:endParaRPr>
           </a:p>
           <a:p>
             <a:pPr lvl="1">
               <a:defRPr/>
             </a:pPr>
             <a:r>
-              <a:rPr lang="en-US" sz="2400" dirty="0" err="1"/>
+              <a:rPr lang="en-US" sz="2400" dirty="0" err="1">
+                <a:latin typeface="Times New Roman"/>
+                <a:cs typeface="Times New Roman"/>
+              </a:rPr>
               <a:t>JUnit</a:t>
             </a:r>
-            <a:endParaRPr lang="en-US" sz="2400" dirty="0"/>
+            <a:endParaRPr lang="en-US" sz="2400" dirty="0">
+              <a:latin typeface="Times New Roman"/>
+              <a:cs typeface="Times New Roman"/>
+            </a:endParaRPr>
           </a:p>
           <a:p>
             <a:pPr lvl="1">
               <a:defRPr/>
             </a:pPr>
             <a:r>
-              <a:rPr lang="en-US" sz="2400" dirty="0" err="1"/>
+              <a:rPr lang="en-US" sz="2400" dirty="0" err="1">
+                <a:latin typeface="Times New Roman"/>
+                <a:cs typeface="Times New Roman"/>
+              </a:rPr>
               <a:t>Haskel</a:t>
             </a:r>
-            <a:endParaRPr lang="en-US" sz="2400" dirty="0"/>
-          </a:p>
-          <a:p>
-            <a:endParaRPr lang="en-US" dirty="0"/>
+            <a:endParaRPr lang="en-US" sz="2400" dirty="0">
+              <a:latin typeface="Times New Roman"/>
+              <a:cs typeface="Times New Roman"/>
+            </a:endParaRPr>
+          </a:p>
+          <a:p>
+            <a:endParaRPr lang="en-US" dirty="0">
+              <a:latin typeface="Times New Roman"/>
+              <a:cs typeface="Times New Roman"/>
+            </a:endParaRPr>
           </a:p>
         </p:txBody>
       </p:sp>
@@ -7350,10 +8135,16 @@
           <a:p>
             <a:pPr algn="l"/>
             <a:r>
-              <a:rPr lang="en-US" dirty="0" smtClean="0"/>
+              <a:rPr lang="en-US" dirty="0" smtClean="0">
+                <a:latin typeface="Times New Roman"/>
+                <a:cs typeface="Times New Roman"/>
+              </a:rPr>
               <a:t>Fault Domains</a:t>
             </a:r>
-            <a:endParaRPr lang="en-US" dirty="0"/>
+            <a:endParaRPr lang="en-US" dirty="0">
+              <a:latin typeface="Times New Roman"/>
+              <a:cs typeface="Times New Roman"/>
+            </a:endParaRPr>
           </a:p>
         </p:txBody>
       </p:sp>
@@ -7376,7 +8167,10 @@
               <a:defRPr/>
             </a:pPr>
             <a:r>
-              <a:rPr lang="en-US" dirty="0"/>
+              <a:rPr lang="en-US" dirty="0">
+                <a:latin typeface="Times New Roman"/>
+                <a:cs typeface="Times New Roman"/>
+              </a:rPr>
               <a:t>Point Fault Domain:</a:t>
             </a:r>
           </a:p>
@@ -7385,21 +8179,33 @@
               <a:defRPr/>
             </a:pPr>
             <a:r>
-              <a:rPr lang="en-US" sz="2400" dirty="0"/>
+              <a:rPr lang="en-US" sz="2400" dirty="0">
+                <a:latin typeface="Times New Roman"/>
+                <a:cs typeface="Times New Roman"/>
+              </a:rPr>
               <a:t>Fault lies scattered across input </a:t>
             </a:r>
             <a:r>
-              <a:rPr lang="en-US" sz="2400" dirty="0" smtClean="0"/>
+              <a:rPr lang="en-US" sz="2400" dirty="0" smtClean="0">
+                <a:latin typeface="Times New Roman"/>
+                <a:cs typeface="Times New Roman"/>
+              </a:rPr>
               <a:t>domain</a:t>
             </a:r>
-            <a:endParaRPr lang="en-US" sz="2400" dirty="0"/>
+            <a:endParaRPr lang="en-US" sz="2400" dirty="0">
+              <a:latin typeface="Times New Roman"/>
+              <a:cs typeface="Times New Roman"/>
+            </a:endParaRPr>
           </a:p>
           <a:p>
             <a:pPr>
               <a:defRPr/>
             </a:pPr>
             <a:r>
-              <a:rPr lang="en-US" dirty="0"/>
+              <a:rPr lang="en-US" dirty="0">
+                <a:latin typeface="Times New Roman"/>
+                <a:cs typeface="Times New Roman"/>
+              </a:rPr>
               <a:t>Block Fault Domain</a:t>
             </a:r>
           </a:p>
@@ -7408,21 +8214,33 @@
               <a:defRPr/>
             </a:pPr>
             <a:r>
-              <a:rPr lang="en-US" sz="2400" dirty="0"/>
+              <a:rPr lang="en-US" sz="2400" dirty="0">
+                <a:latin typeface="Times New Roman"/>
+                <a:cs typeface="Times New Roman"/>
+              </a:rPr>
               <a:t>Fault lies in a block across input </a:t>
             </a:r>
             <a:r>
-              <a:rPr lang="en-US" sz="2400" dirty="0" smtClean="0"/>
+              <a:rPr lang="en-US" sz="2400" dirty="0" smtClean="0">
+                <a:latin typeface="Times New Roman"/>
+                <a:cs typeface="Times New Roman"/>
+              </a:rPr>
               <a:t>domain</a:t>
             </a:r>
-            <a:endParaRPr lang="en-US" sz="2400" dirty="0"/>
+            <a:endParaRPr lang="en-US" sz="2400" dirty="0">
+              <a:latin typeface="Times New Roman"/>
+              <a:cs typeface="Times New Roman"/>
+            </a:endParaRPr>
           </a:p>
           <a:p>
             <a:pPr>
               <a:defRPr/>
             </a:pPr>
             <a:r>
-              <a:rPr lang="en-US" dirty="0"/>
+              <a:rPr lang="en-US" dirty="0">
+                <a:latin typeface="Times New Roman"/>
+                <a:cs typeface="Times New Roman"/>
+              </a:rPr>
               <a:t>Strip Fault Domain </a:t>
             </a:r>
           </a:p>
@@ -7431,14 +8249,23 @@
               <a:defRPr/>
             </a:pPr>
             <a:r>
-              <a:rPr lang="en-US" sz="2400" dirty="0"/>
+              <a:rPr lang="en-US" sz="2400" dirty="0">
+                <a:latin typeface="Times New Roman"/>
+                <a:cs typeface="Times New Roman"/>
+              </a:rPr>
               <a:t>Fault lies in a strip across the input </a:t>
             </a:r>
             <a:r>
-              <a:rPr lang="en-US" sz="2400" dirty="0" smtClean="0"/>
+              <a:rPr lang="en-US" sz="2400" dirty="0" smtClean="0">
+                <a:latin typeface="Times New Roman"/>
+                <a:cs typeface="Times New Roman"/>
+              </a:rPr>
               <a:t>domain</a:t>
             </a:r>
-            <a:endParaRPr lang="en-US" sz="2400" dirty="0"/>
+            <a:endParaRPr lang="en-US" sz="2400" dirty="0">
+              <a:latin typeface="Times New Roman"/>
+              <a:cs typeface="Times New Roman"/>
+            </a:endParaRPr>
           </a:p>
         </p:txBody>
       </p:sp>
@@ -7816,10 +8643,16 @@
           <a:p>
             <a:pPr algn="l"/>
             <a:r>
-              <a:rPr lang="en-US" dirty="0" smtClean="0"/>
+              <a:rPr lang="en-US" dirty="0" smtClean="0">
+                <a:latin typeface="Times New Roman"/>
+                <a:cs typeface="Times New Roman"/>
+              </a:rPr>
               <a:t>Need of Improvement</a:t>
             </a:r>
-            <a:endParaRPr lang="en-US" dirty="0"/>
+            <a:endParaRPr lang="en-US" dirty="0">
+              <a:latin typeface="Times New Roman"/>
+              <a:cs typeface="Times New Roman"/>
+            </a:endParaRPr>
           </a:p>
         </p:txBody>
       </p:sp>
@@ -7844,7 +8677,10 @@
               <a:defRPr/>
             </a:pPr>
             <a:r>
-              <a:rPr lang="en-US" sz="2800" dirty="0"/>
+              <a:rPr lang="en-US" sz="2800" dirty="0">
+                <a:latin typeface="Times New Roman"/>
+                <a:cs typeface="Times New Roman"/>
+              </a:rPr>
               <a:t>To increase coverage</a:t>
             </a:r>
           </a:p>
@@ -7853,7 +8689,10 @@
               <a:defRPr/>
             </a:pPr>
             <a:r>
-              <a:rPr lang="en-US" sz="2800" dirty="0"/>
+              <a:rPr lang="en-US" sz="2800" dirty="0">
+                <a:latin typeface="Times New Roman"/>
+                <a:cs typeface="Times New Roman"/>
+              </a:rPr>
               <a:t>To increase efficiency</a:t>
             </a:r>
           </a:p>
@@ -7862,7 +8701,10 @@
               <a:defRPr/>
             </a:pPr>
             <a:r>
-              <a:rPr lang="en-US" sz="2800" dirty="0"/>
+              <a:rPr lang="en-US" sz="2800" dirty="0">
+                <a:latin typeface="Times New Roman"/>
+                <a:cs typeface="Times New Roman"/>
+              </a:rPr>
               <a:t>To decrease over-head</a:t>
             </a:r>
           </a:p>
@@ -7871,7 +8713,10 @@
               <a:defRPr/>
             </a:pPr>
             <a:r>
-              <a:rPr lang="en-US" sz="2800" dirty="0"/>
+              <a:rPr lang="en-US" sz="2800" dirty="0">
+                <a:latin typeface="Times New Roman"/>
+                <a:cs typeface="Times New Roman"/>
+              </a:rPr>
               <a:t>To generate friendly output</a:t>
             </a:r>
           </a:p>
@@ -7880,14 +8725,23 @@
               <a:defRPr/>
             </a:pPr>
             <a:r>
-              <a:rPr lang="en-US" sz="2800" dirty="0"/>
+              <a:rPr lang="en-US" sz="2800" dirty="0">
+                <a:latin typeface="Times New Roman"/>
+                <a:cs typeface="Times New Roman"/>
+              </a:rPr>
               <a:t>To introduce </a:t>
             </a:r>
             <a:r>
-              <a:rPr lang="en-US" sz="2800" dirty="0" smtClean="0"/>
+              <a:rPr lang="en-US" sz="2800" dirty="0" smtClean="0">
+                <a:latin typeface="Times New Roman"/>
+                <a:cs typeface="Times New Roman"/>
+              </a:rPr>
               <a:t>automation</a:t>
             </a:r>
-            <a:endParaRPr lang="en-US" sz="2800" dirty="0"/>
+            <a:endParaRPr lang="en-US" sz="2800" dirty="0">
+              <a:latin typeface="Times New Roman"/>
+              <a:cs typeface="Times New Roman"/>
+            </a:endParaRPr>
           </a:p>
         </p:txBody>
       </p:sp>
@@ -7955,6 +8809,13 @@
   <p:clrMapOvr>
     <a:masterClrMapping/>
   </p:clrMapOvr>
+  <p:timing>
+    <p:tnLst>
+      <p:par>
+        <p:cTn xmlns:p14="http://schemas.microsoft.com/office/powerpoint/2010/main" id="1" dur="indefinite" restart="never" nodeType="tmRoot"/>
+      </p:par>
+    </p:tnLst>
+  </p:timing>
 </p:sld>
 </file>
 
@@ -7994,11 +8855,15 @@
           <a:p>
             <a:r>
               <a:rPr lang="en-US" dirty="0" smtClean="0">
-                <a:cs typeface="+mj-cs"/>
+                <a:latin typeface="Times New Roman"/>
+                <a:cs typeface="Times New Roman"/>
               </a:rPr>
               <a:t>Enhanced versions of Random Testing</a:t>
             </a:r>
-            <a:endParaRPr lang="en-US" dirty="0"/>
+            <a:endParaRPr lang="en-US" dirty="0">
+              <a:latin typeface="Times New Roman"/>
+              <a:cs typeface="Times New Roman"/>
+            </a:endParaRPr>
           </a:p>
         </p:txBody>
       </p:sp>
@@ -8023,7 +8888,10 @@
               <a:defRPr/>
             </a:pPr>
             <a:r>
-              <a:rPr lang="en-US" sz="2800" dirty="0"/>
+              <a:rPr lang="en-US" sz="2800" dirty="0">
+                <a:latin typeface="Times New Roman"/>
+                <a:cs typeface="Times New Roman"/>
+              </a:rPr>
               <a:t>Adaptive Random Testing (ART)</a:t>
             </a:r>
           </a:p>
@@ -8032,7 +8900,10 @@
               <a:defRPr/>
             </a:pPr>
             <a:r>
-              <a:rPr lang="en-US" sz="2800" dirty="0"/>
+              <a:rPr lang="en-US" sz="2800" dirty="0">
+                <a:latin typeface="Times New Roman"/>
+                <a:cs typeface="Times New Roman"/>
+              </a:rPr>
               <a:t>Quasi Random Testing (QRT)</a:t>
             </a:r>
           </a:p>
@@ -8041,7 +8912,10 @@
               <a:defRPr/>
             </a:pPr>
             <a:r>
-              <a:rPr lang="en-US" sz="2800" dirty="0"/>
+              <a:rPr lang="en-US" sz="2800" dirty="0">
+                <a:latin typeface="Times New Roman"/>
+                <a:cs typeface="Times New Roman"/>
+              </a:rPr>
               <a:t>Mirror Adaptive Random Testing (MART)</a:t>
             </a:r>
           </a:p>
@@ -8050,7 +8924,10 @@
               <a:defRPr/>
             </a:pPr>
             <a:r>
-              <a:rPr lang="en-US" sz="2800" dirty="0"/>
+              <a:rPr lang="en-US" sz="2800" dirty="0">
+                <a:latin typeface="Times New Roman"/>
+                <a:cs typeface="Times New Roman"/>
+              </a:rPr>
               <a:t>Restricted Random Testing (RRT)</a:t>
             </a:r>
           </a:p>
@@ -8059,7 +8936,10 @@
               <a:defRPr/>
             </a:pPr>
             <a:r>
-              <a:rPr lang="en-US" sz="2800" dirty="0"/>
+              <a:rPr lang="en-US" sz="2800" dirty="0">
+                <a:latin typeface="Times New Roman"/>
+                <a:cs typeface="Times New Roman"/>
+              </a:rPr>
               <a:t>Feedback-Directed Random Testing (FDRT)</a:t>
             </a:r>
           </a:p>
@@ -8068,14 +8948,23 @@
               <a:defRPr/>
             </a:pPr>
             <a:r>
-              <a:rPr lang="en-US" sz="2800" dirty="0"/>
+              <a:rPr lang="en-US" sz="2800" dirty="0">
+                <a:latin typeface="Times New Roman"/>
+                <a:cs typeface="Times New Roman"/>
+              </a:rPr>
               <a:t>Random+ Testing (R+</a:t>
             </a:r>
             <a:r>
-              <a:rPr lang="en-US" sz="2800" dirty="0" smtClean="0"/>
+              <a:rPr lang="en-US" sz="2800" dirty="0" smtClean="0">
+                <a:latin typeface="Times New Roman"/>
+                <a:cs typeface="Times New Roman"/>
+              </a:rPr>
               <a:t>)</a:t>
             </a:r>
-            <a:endParaRPr lang="en-US" sz="2800" dirty="0"/>
+            <a:endParaRPr lang="en-US" sz="2800" dirty="0">
+              <a:latin typeface="Times New Roman"/>
+              <a:cs typeface="Times New Roman"/>
+            </a:endParaRPr>
           </a:p>
         </p:txBody>
       </p:sp>
@@ -8089,6 +8978,13 @@
   <p:clrMapOvr>
     <a:masterClrMapping/>
   </p:clrMapOvr>
+  <p:timing>
+    <p:tnLst>
+      <p:par>
+        <p:cTn xmlns:p14="http://schemas.microsoft.com/office/powerpoint/2010/main" id="1" dur="indefinite" restart="never" nodeType="tmRoot"/>
+      </p:par>
+    </p:tnLst>
+  </p:timing>
 </p:sld>
 </file>
 

</xml_diff>

<commit_message>
Minor changes in ADFD presentation, ADFD paper, ADFD strategy.
</commit_message>
<xml_diff>
--- a/ThesisSeminar/newOne.pptx
+++ b/ThesisSeminar/newOne.pptx
@@ -787,11 +787,11 @@
         </c:dLbls>
         <c:marker val="1"/>
         <c:smooth val="0"/>
-        <c:axId val="2146239048"/>
-        <c:axId val="2146314984"/>
+        <c:axId val="1800362744"/>
+        <c:axId val="1800365784"/>
       </c:lineChart>
       <c:catAx>
-        <c:axId val="2146239048"/>
+        <c:axId val="1800362744"/>
         <c:scaling>
           <c:orientation val="minMax"/>
         </c:scaling>
@@ -801,7 +801,7 @@
         <c:majorTickMark val="none"/>
         <c:minorTickMark val="none"/>
         <c:tickLblPos val="nextTo"/>
-        <c:crossAx val="2146314984"/>
+        <c:crossAx val="1800365784"/>
         <c:crosses val="autoZero"/>
         <c:auto val="1"/>
         <c:lblAlgn val="ctr"/>
@@ -809,7 +809,7 @@
         <c:noMultiLvlLbl val="0"/>
       </c:catAx>
       <c:valAx>
-        <c:axId val="2146314984"/>
+        <c:axId val="1800365784"/>
         <c:scaling>
           <c:orientation val="minMax"/>
         </c:scaling>
@@ -843,7 +843,7 @@
         <c:majorTickMark val="none"/>
         <c:minorTickMark val="none"/>
         <c:tickLblPos val="nextTo"/>
-        <c:crossAx val="2146239048"/>
+        <c:crossAx val="1800362744"/>
         <c:crosses val="autoZero"/>
         <c:crossBetween val="between"/>
       </c:valAx>
@@ -1201,11 +1201,11 @@
         </c:dLbls>
         <c:marker val="1"/>
         <c:smooth val="0"/>
-        <c:axId val="2146379080"/>
-        <c:axId val="2146382136"/>
+        <c:axId val="1799523256"/>
+        <c:axId val="1799526040"/>
       </c:lineChart>
       <c:catAx>
-        <c:axId val="2146379080"/>
+        <c:axId val="1799523256"/>
         <c:scaling>
           <c:orientation val="minMax"/>
         </c:scaling>
@@ -1215,7 +1215,7 @@
         <c:majorTickMark val="none"/>
         <c:minorTickMark val="none"/>
         <c:tickLblPos val="nextTo"/>
-        <c:crossAx val="2146382136"/>
+        <c:crossAx val="1799526040"/>
         <c:crosses val="autoZero"/>
         <c:auto val="1"/>
         <c:lblAlgn val="ctr"/>
@@ -1223,7 +1223,7 @@
         <c:noMultiLvlLbl val="0"/>
       </c:catAx>
       <c:valAx>
-        <c:axId val="2146382136"/>
+        <c:axId val="1799526040"/>
         <c:scaling>
           <c:orientation val="minMax"/>
         </c:scaling>
@@ -1258,7 +1258,7 @@
         <c:majorTickMark val="none"/>
         <c:minorTickMark val="none"/>
         <c:tickLblPos val="nextTo"/>
-        <c:crossAx val="2146379080"/>
+        <c:crossAx val="1799523256"/>
         <c:crosses val="autoZero"/>
         <c:crossBetween val="between"/>
       </c:valAx>
@@ -1386,7 +1386,7 @@
           <a:p>
             <a:fld id="{49D87847-25F0-7448-9E96-DB87D15DD748}" type="datetimeFigureOut">
               <a:rPr lang="en-US" smtClean="0"/>
-              <a:t>21/01/2013</a:t>
+              <a:t>23/01/2013</a:t>
             </a:fld>
             <a:endParaRPr lang="en-US"/>
           </a:p>
@@ -2114,7 +2114,7 @@
           <a:p>
             <a:fld id="{2D2B0758-6489-CF4D-BEB3-FD09930D1791}" type="datetimeFigureOut">
               <a:rPr lang="en-US" smtClean="0"/>
-              <a:t>21/01/2013</a:t>
+              <a:t>23/01/2013</a:t>
             </a:fld>
             <a:endParaRPr lang="en-US"/>
           </a:p>
@@ -2284,7 +2284,7 @@
           <a:p>
             <a:fld id="{2D2B0758-6489-CF4D-BEB3-FD09930D1791}" type="datetimeFigureOut">
               <a:rPr lang="en-US" smtClean="0"/>
-              <a:t>21/01/2013</a:t>
+              <a:t>23/01/2013</a:t>
             </a:fld>
             <a:endParaRPr lang="en-US"/>
           </a:p>
@@ -2464,7 +2464,7 @@
           <a:p>
             <a:fld id="{2D2B0758-6489-CF4D-BEB3-FD09930D1791}" type="datetimeFigureOut">
               <a:rPr lang="en-US" smtClean="0"/>
-              <a:t>21/01/2013</a:t>
+              <a:t>23/01/2013</a:t>
             </a:fld>
             <a:endParaRPr lang="en-US"/>
           </a:p>
@@ -2634,7 +2634,7 @@
           <a:p>
             <a:fld id="{2D2B0758-6489-CF4D-BEB3-FD09930D1791}" type="datetimeFigureOut">
               <a:rPr lang="en-US" smtClean="0"/>
-              <a:t>21/01/2013</a:t>
+              <a:t>23/01/2013</a:t>
             </a:fld>
             <a:endParaRPr lang="en-US"/>
           </a:p>
@@ -2880,7 +2880,7 @@
           <a:p>
             <a:fld id="{2D2B0758-6489-CF4D-BEB3-FD09930D1791}" type="datetimeFigureOut">
               <a:rPr lang="en-US" smtClean="0"/>
-              <a:t>21/01/2013</a:t>
+              <a:t>23/01/2013</a:t>
             </a:fld>
             <a:endParaRPr lang="en-US"/>
           </a:p>
@@ -3168,7 +3168,7 @@
           <a:p>
             <a:fld id="{2D2B0758-6489-CF4D-BEB3-FD09930D1791}" type="datetimeFigureOut">
               <a:rPr lang="en-US" smtClean="0"/>
-              <a:t>21/01/2013</a:t>
+              <a:t>23/01/2013</a:t>
             </a:fld>
             <a:endParaRPr lang="en-US"/>
           </a:p>
@@ -3590,7 +3590,7 @@
           <a:p>
             <a:fld id="{2D2B0758-6489-CF4D-BEB3-FD09930D1791}" type="datetimeFigureOut">
               <a:rPr lang="en-US" smtClean="0"/>
-              <a:t>21/01/2013</a:t>
+              <a:t>23/01/2013</a:t>
             </a:fld>
             <a:endParaRPr lang="en-US"/>
           </a:p>
@@ -3708,7 +3708,7 @@
           <a:p>
             <a:fld id="{2D2B0758-6489-CF4D-BEB3-FD09930D1791}" type="datetimeFigureOut">
               <a:rPr lang="en-US" smtClean="0"/>
-              <a:t>21/01/2013</a:t>
+              <a:t>23/01/2013</a:t>
             </a:fld>
             <a:endParaRPr lang="en-US"/>
           </a:p>
@@ -3803,7 +3803,7 @@
           <a:p>
             <a:fld id="{2D2B0758-6489-CF4D-BEB3-FD09930D1791}" type="datetimeFigureOut">
               <a:rPr lang="en-US" smtClean="0"/>
-              <a:t>21/01/2013</a:t>
+              <a:t>23/01/2013</a:t>
             </a:fld>
             <a:endParaRPr lang="en-US"/>
           </a:p>
@@ -4080,7 +4080,7 @@
           <a:p>
             <a:fld id="{2D2B0758-6489-CF4D-BEB3-FD09930D1791}" type="datetimeFigureOut">
               <a:rPr lang="en-US" smtClean="0"/>
-              <a:t>21/01/2013</a:t>
+              <a:t>23/01/2013</a:t>
             </a:fld>
             <a:endParaRPr lang="en-US"/>
           </a:p>
@@ -4333,7 +4333,7 @@
           <a:p>
             <a:fld id="{2D2B0758-6489-CF4D-BEB3-FD09930D1791}" type="datetimeFigureOut">
               <a:rPr lang="en-US" smtClean="0"/>
-              <a:t>21/01/2013</a:t>
+              <a:t>23/01/2013</a:t>
             </a:fld>
             <a:endParaRPr lang="en-US"/>
           </a:p>
@@ -4546,7 +4546,7 @@
           <a:p>
             <a:fld id="{2D2B0758-6489-CF4D-BEB3-FD09930D1791}" type="datetimeFigureOut">
               <a:rPr lang="en-US" smtClean="0"/>
-              <a:t>21/01/2013</a:t>
+              <a:t>23/01/2013</a:t>
             </a:fld>
             <a:endParaRPr lang="en-US"/>
           </a:p>
@@ -4942,25 +4942,7 @@
               <a:rPr lang="en-US" dirty="0" smtClean="0">
                 <a:cs typeface="Times New Roman"/>
               </a:rPr>
-              <a:t>New Strategies for Finding </a:t>
-            </a:r>
-            <a:r>
-              <a:rPr lang="en-US" dirty="0" smtClean="0">
-                <a:cs typeface="Times New Roman"/>
-              </a:rPr>
-              <a:t>Failures </a:t>
-            </a:r>
-            <a:r>
-              <a:rPr lang="en-US" dirty="0" smtClean="0">
-                <a:cs typeface="Times New Roman"/>
-              </a:rPr>
-              <a:t>and its </a:t>
-            </a:r>
-            <a:r>
-              <a:rPr lang="en-US" dirty="0" smtClean="0">
-                <a:cs typeface="Times New Roman"/>
-              </a:rPr>
-              <a:t>Domains</a:t>
+              <a:t>New Strategies for Finding Failures and its Domains</a:t>
             </a:r>
             <a:endParaRPr lang="en-US" dirty="0">
               <a:cs typeface="Times New Roman"/>
@@ -5604,11 +5586,11 @@
   <p:clrMapOvr>
     <a:masterClrMapping/>
   </p:clrMapOvr>
-  <mc:AlternateContent xmlns:mc="http://schemas.openxmlformats.org/markup-compatibility/2006">
-    <mc:Choice xmlns:p14="http://schemas.microsoft.com/office/powerpoint/2010/main" Requires="p14">
+  <mc:AlternateContent xmlns:mc="http://schemas.openxmlformats.org/markup-compatibility/2006" xmlns:p14="http://schemas.microsoft.com/office/powerpoint/2010/main">
+    <mc:Choice Requires="p14">
       <p:transition spd="slow" p14:dur="2000" advClick="0"/>
     </mc:Choice>
-    <mc:Fallback>
+    <mc:Fallback xmlns="">
       <p:transition xmlns:p14="http://schemas.microsoft.com/office/powerpoint/2010/main" spd="slow" advClick="0"/>
     </mc:Fallback>
   </mc:AlternateContent>
@@ -6394,19 +6376,7 @@
               <a:rPr lang="en-US" dirty="0" smtClean="0">
                 <a:cs typeface="Times New Roman"/>
               </a:rPr>
-              <a:t>Example to </a:t>
-            </a:r>
-            <a:r>
-              <a:rPr lang="en-US" dirty="0" smtClean="0">
-                <a:cs typeface="Times New Roman"/>
-              </a:rPr>
-              <a:t>illustrate working of DSSR </a:t>
-            </a:r>
-            <a:r>
-              <a:rPr lang="en-US" dirty="0" smtClean="0">
-                <a:cs typeface="Times New Roman"/>
-              </a:rPr>
-              <a:t>strategy</a:t>
+              <a:t>Example to illustrate working of DSSR strategy</a:t>
             </a:r>
             <a:endParaRPr lang="en-US" dirty="0">
               <a:cs typeface="Times New Roman"/>
@@ -7311,19 +7281,7 @@
               <a:rPr lang="en-US" sz="2800" dirty="0">
                 <a:cs typeface="Times New Roman"/>
               </a:rPr>
-              <a:t>Lake </a:t>
-            </a:r>
-            <a:r>
-              <a:rPr lang="en-US" sz="2800" dirty="0">
-                <a:cs typeface="Times New Roman"/>
-              </a:rPr>
-              <a:t>of</a:t>
-            </a:r>
-            <a:r>
-              <a:rPr lang="en-US" sz="2800" dirty="0">
-                <a:cs typeface="Times New Roman"/>
-              </a:rPr>
-              <a:t> improvement for point fault domain</a:t>
+              <a:t>Lake of improvement for point fault domain</a:t>
             </a:r>
           </a:p>
           <a:p>
@@ -8673,10 +8631,6 @@
               </a:rPr>
               <a:t>}</a:t>
             </a:r>
-            <a:endParaRPr lang="en-US" sz="1200" dirty="0">
-              <a:latin typeface="Times New Roman"/>
-              <a:cs typeface="Times New Roman"/>
-            </a:endParaRPr>
           </a:p>
         </p:txBody>
       </p:sp>
@@ -11653,17 +11607,8 @@
               <a:rPr lang="en-US" sz="2800" dirty="0">
                 <a:cs typeface="Times New Roman"/>
               </a:rPr>
-              <a:t>Dirt Spot Sweeping Random </a:t>
-            </a:r>
-            <a:r>
-              <a:rPr lang="en-US" sz="2800" dirty="0">
-                <a:cs typeface="Times New Roman"/>
-              </a:rPr>
-              <a:t>Strategy</a:t>
-            </a:r>
-            <a:endParaRPr lang="en-US" sz="2800" dirty="0">
-              <a:cs typeface="Times New Roman"/>
-            </a:endParaRPr>
+              <a:t>Dirt Spot Sweeping Random Strategy</a:t>
+            </a:r>
           </a:p>
           <a:p>
             <a:pPr marL="722313" indent="-273050">
@@ -11984,19 +11929,55 @@
               <a:rPr lang="en-US" sz="2800" dirty="0">
                 <a:cs typeface="Times New Roman"/>
               </a:rPr>
-              <a:t>Testing of all </a:t>
+              <a:t>Testing of all values is </a:t>
+            </a:r>
+            <a:r>
+              <a:rPr lang="en-US" sz="2800" dirty="0" smtClean="0">
+                <a:cs typeface="Times New Roman"/>
+              </a:rPr>
+              <a:t>impossible</a:t>
+            </a:r>
+          </a:p>
+          <a:p>
+            <a:pPr lvl="1">
+              <a:defRPr/>
+            </a:pPr>
+            <a:r>
+              <a:rPr lang="en-US" sz="2400" dirty="0" smtClean="0">
+                <a:cs typeface="Times New Roman"/>
+              </a:rPr>
+              <a:t>Infinite values between 0 and 1</a:t>
+            </a:r>
+            <a:endParaRPr lang="en-US" sz="2400" dirty="0" smtClean="0">
+              <a:cs typeface="Times New Roman"/>
+            </a:endParaRPr>
+          </a:p>
+          <a:p>
+            <a:pPr>
+              <a:defRPr/>
+            </a:pPr>
+            <a:r>
+              <a:rPr lang="en-US" sz="2800" dirty="0" smtClean="0">
+                <a:cs typeface="Times New Roman"/>
+              </a:rPr>
+              <a:t>Limited </a:t>
             </a:r>
             <a:r>
               <a:rPr lang="en-US" sz="2800" dirty="0">
                 <a:cs typeface="Times New Roman"/>
               </a:rPr>
-              <a:t>values</a:t>
-            </a:r>
+              <a:t>Time and Resources</a:t>
+            </a:r>
+          </a:p>
+          <a:p>
+            <a:pPr>
+              <a:defRPr/>
+            </a:pPr>
             <a:r>
               <a:rPr lang="en-US" sz="2800" dirty="0">
                 <a:cs typeface="Times New Roman"/>
               </a:rPr>
-              <a:t> is impossible</a:t>
+              <a:t>Simple but practical selection approach</a:t>
             </a:r>
           </a:p>
           <a:p>
@@ -12007,35 +11988,7 @@
               <a:rPr lang="en-US" sz="2800" dirty="0">
                 <a:cs typeface="Times New Roman"/>
               </a:rPr>
-              <a:t>Limited Time and Resources</a:t>
-            </a:r>
-          </a:p>
-          <a:p>
-            <a:pPr>
-              <a:defRPr/>
-            </a:pPr>
-            <a:r>
-              <a:rPr lang="en-US" sz="2800" dirty="0">
-                <a:cs typeface="Times New Roman"/>
-              </a:rPr>
-              <a:t>Simple but practical selection approach</a:t>
-            </a:r>
-          </a:p>
-          <a:p>
-            <a:pPr>
-              <a:defRPr/>
-            </a:pPr>
-            <a:r>
-              <a:rPr lang="en-US" sz="2800" dirty="0">
-                <a:cs typeface="Times New Roman"/>
-              </a:rPr>
-              <a:t>Easy </a:t>
-            </a:r>
-            <a:r>
-              <a:rPr lang="en-US" sz="2800" dirty="0">
-                <a:cs typeface="Times New Roman"/>
-              </a:rPr>
-              <a:t>implementation</a:t>
+              <a:t>Easy implementation</a:t>
             </a:r>
           </a:p>
           <a:p>
@@ -12193,13 +12146,7 @@
               <a:rPr lang="en-US" dirty="0" smtClean="0">
                 <a:cs typeface="Times New Roman"/>
               </a:rPr>
-              <a:t>What is Random </a:t>
-            </a:r>
-            <a:r>
-              <a:rPr lang="en-US" dirty="0" smtClean="0">
-                <a:cs typeface="Times New Roman"/>
-              </a:rPr>
-              <a:t>Testing?</a:t>
+              <a:t>What is Random Testing?</a:t>
             </a:r>
             <a:endParaRPr lang="en-US" dirty="0">
               <a:cs typeface="Times New Roman"/>
@@ -12231,19 +12178,29 @@
               <a:rPr lang="en-US" sz="2800" dirty="0">
                 <a:cs typeface="Times New Roman"/>
               </a:rPr>
-              <a:t>Black-box </a:t>
-            </a:r>
+              <a:t>Black-box testing technique</a:t>
+            </a:r>
+          </a:p>
+          <a:p>
+            <a:pPr>
+              <a:defRPr/>
+            </a:pPr>
             <a:r>
               <a:rPr lang="en-US" sz="2800" dirty="0">
                 <a:cs typeface="Times New Roman"/>
               </a:rPr>
-              <a:t>testing</a:t>
-            </a:r>
+              <a:t>Dynamic testing process</a:t>
+            </a:r>
+          </a:p>
+          <a:p>
+            <a:pPr>
+              <a:defRPr/>
+            </a:pPr>
             <a:r>
               <a:rPr lang="en-US" sz="2800" dirty="0">
                 <a:cs typeface="Times New Roman"/>
               </a:rPr>
-              <a:t> technique</a:t>
+              <a:t>Input Domain</a:t>
             </a:r>
           </a:p>
           <a:p>
@@ -12254,75 +12211,29 @@
               <a:rPr lang="en-US" sz="2800" dirty="0">
                 <a:cs typeface="Times New Roman"/>
               </a:rPr>
-              <a:t>Dynamic </a:t>
-            </a:r>
+              <a:t>Random Selection</a:t>
+            </a:r>
+          </a:p>
+          <a:p>
+            <a:pPr>
+              <a:defRPr/>
+            </a:pPr>
             <a:r>
               <a:rPr lang="en-US" sz="2800" dirty="0">
                 <a:cs typeface="Times New Roman"/>
               </a:rPr>
-              <a:t>testing</a:t>
-            </a:r>
+              <a:t>Test Execution</a:t>
+            </a:r>
+          </a:p>
+          <a:p>
+            <a:pPr>
+              <a:defRPr/>
+            </a:pPr>
             <a:r>
               <a:rPr lang="en-US" sz="2800" dirty="0">
                 <a:cs typeface="Times New Roman"/>
               </a:rPr>
-              <a:t> process</a:t>
-            </a:r>
-          </a:p>
-          <a:p>
-            <a:pPr>
-              <a:defRPr/>
-            </a:pPr>
-            <a:r>
-              <a:rPr lang="en-US" sz="2800" dirty="0">
-                <a:cs typeface="Times New Roman"/>
-              </a:rPr>
-              <a:t>Input Domain</a:t>
-            </a:r>
-          </a:p>
-          <a:p>
-            <a:pPr>
-              <a:defRPr/>
-            </a:pPr>
-            <a:r>
-              <a:rPr lang="en-US" sz="2800" dirty="0">
-                <a:cs typeface="Times New Roman"/>
-              </a:rPr>
-              <a:t>Random Selection</a:t>
-            </a:r>
-          </a:p>
-          <a:p>
-            <a:pPr>
-              <a:defRPr/>
-            </a:pPr>
-            <a:r>
-              <a:rPr lang="en-US" sz="2800" dirty="0">
-                <a:cs typeface="Times New Roman"/>
-              </a:rPr>
-              <a:t>Test </a:t>
-            </a:r>
-            <a:r>
-              <a:rPr lang="en-US" sz="2800" dirty="0">
-                <a:cs typeface="Times New Roman"/>
-              </a:rPr>
-              <a:t>Execution</a:t>
-            </a:r>
-          </a:p>
-          <a:p>
-            <a:pPr>
-              <a:defRPr/>
-            </a:pPr>
-            <a:r>
-              <a:rPr lang="en-US" sz="2800" dirty="0">
-                <a:cs typeface="Times New Roman"/>
-              </a:rPr>
-              <a:t>Test </a:t>
-            </a:r>
-            <a:r>
-              <a:rPr lang="en-US" sz="2800" dirty="0">
-                <a:cs typeface="Times New Roman"/>
-              </a:rPr>
-              <a:t>Evaluation</a:t>
+              <a:t>Test Evaluation</a:t>
             </a:r>
           </a:p>
           <a:p>
@@ -12535,27 +12446,19 @@
               </a:rPr>
               <a:t>Automating the process of random testing </a:t>
             </a:r>
-          </a:p>
-          <a:p>
-            <a:pPr>
-              <a:defRPr/>
-            </a:pPr>
-            <a:r>
-              <a:rPr lang="en-US" sz="2800" dirty="0">
-                <a:cs typeface="Times New Roman"/>
-              </a:rPr>
-              <a:t>Automated Random Testing Tools:</a:t>
-            </a:r>
+            <a:endParaRPr lang="en-US" sz="2800" dirty="0" smtClean="0">
+              <a:cs typeface="Times New Roman"/>
+            </a:endParaRPr>
           </a:p>
           <a:p>
             <a:pPr lvl="1">
               <a:defRPr/>
             </a:pPr>
             <a:r>
-              <a:rPr lang="en-US" sz="2400" dirty="0">
-                <a:cs typeface="Times New Roman"/>
-              </a:rPr>
-              <a:t>YETI</a:t>
+              <a:rPr lang="en-US" sz="2400" dirty="0" smtClean="0">
+                <a:cs typeface="Times New Roman"/>
+              </a:rPr>
+              <a:t>Test data generation</a:t>
             </a:r>
           </a:p>
           <a:p>
@@ -12563,58 +12466,52 @@
               <a:defRPr/>
             </a:pPr>
             <a:r>
-              <a:rPr lang="en-US" sz="2400" dirty="0" err="1">
-                <a:cs typeface="Times New Roman"/>
-              </a:rPr>
-              <a:t>JCrasher</a:t>
+              <a:rPr lang="en-US" sz="2400" dirty="0" smtClean="0">
+                <a:cs typeface="Times New Roman"/>
+              </a:rPr>
+              <a:t>Test execution</a:t>
+            </a:r>
+          </a:p>
+          <a:p>
+            <a:pPr lvl="1">
+              <a:defRPr/>
+            </a:pPr>
+            <a:r>
+              <a:rPr lang="en-US" sz="2400" dirty="0" smtClean="0">
+                <a:cs typeface="Times New Roman"/>
+              </a:rPr>
+              <a:t>Test oracle</a:t>
+            </a:r>
+          </a:p>
+          <a:p>
+            <a:pPr lvl="1">
+              <a:defRPr/>
+            </a:pPr>
+            <a:r>
+              <a:rPr lang="en-US" sz="2400" dirty="0" smtClean="0">
+                <a:cs typeface="Times New Roman"/>
+              </a:rPr>
+              <a:t>Evaluation Report</a:t>
+            </a:r>
+          </a:p>
+          <a:p>
+            <a:pPr lvl="1">
+              <a:defRPr/>
+            </a:pPr>
+            <a:r>
+              <a:rPr lang="en-US" sz="2400" dirty="0" smtClean="0">
+                <a:cs typeface="Times New Roman"/>
+              </a:rPr>
+              <a:t>Regression Test cases</a:t>
             </a:r>
             <a:endParaRPr lang="en-US" sz="2400" dirty="0">
               <a:cs typeface="Times New Roman"/>
             </a:endParaRPr>
           </a:p>
           <a:p>
-            <a:pPr lvl="1">
-              <a:defRPr/>
-            </a:pPr>
-            <a:r>
-              <a:rPr lang="en-US" sz="2400" dirty="0" err="1">
-                <a:cs typeface="Times New Roman"/>
-              </a:rPr>
-              <a:t>JUnit</a:t>
-            </a:r>
-            <a:endParaRPr lang="en-US" sz="2400" dirty="0">
-              <a:cs typeface="Times New Roman"/>
-            </a:endParaRPr>
-          </a:p>
-          <a:p>
-            <a:pPr lvl="1">
-              <a:defRPr/>
-            </a:pPr>
-            <a:r>
-              <a:rPr lang="en-US" sz="2400" dirty="0" err="1" smtClean="0">
-                <a:cs typeface="Times New Roman"/>
-              </a:rPr>
-              <a:t>Haskel</a:t>
-            </a:r>
-            <a:endParaRPr lang="en-US" sz="2400" dirty="0" smtClean="0">
-              <a:cs typeface="Times New Roman"/>
-            </a:endParaRPr>
-          </a:p>
-          <a:p>
-            <a:pPr lvl="1">
-              <a:defRPr/>
-            </a:pPr>
-            <a:r>
-              <a:rPr lang="en-US" sz="2400" dirty="0" err="1" smtClean="0">
-                <a:cs typeface="Times New Roman"/>
-              </a:rPr>
-              <a:t>Eclet</a:t>
-            </a:r>
-            <a:endParaRPr lang="en-US" sz="2400" dirty="0">
-              <a:cs typeface="Times New Roman"/>
-            </a:endParaRPr>
-          </a:p>
-          <a:p>
+            <a:pPr marL="0" indent="0">
+              <a:buNone/>
+            </a:pPr>
             <a:endParaRPr lang="en-US" dirty="0">
               <a:cs typeface="Times New Roman"/>
             </a:endParaRPr>
@@ -12732,11 +12629,24 @@
           <a:bodyPr/>
           <a:lstStyle/>
           <a:p>
-            <a:r>
-              <a:rPr lang="en-US" dirty="0" smtClean="0"/>
-              <a:t>Automated Random Testing Tools</a:t>
-            </a:r>
-            <a:endParaRPr lang="en-US" dirty="0"/>
+            <a:pPr>
+              <a:defRPr/>
+            </a:pPr>
+            <a:r>
+              <a:rPr lang="en-US" dirty="0">
+                <a:cs typeface="Times New Roman"/>
+              </a:rPr>
+              <a:t>Automated Random Testing </a:t>
+            </a:r>
+            <a:r>
+              <a:rPr lang="en-US" dirty="0" smtClean="0">
+                <a:cs typeface="Times New Roman"/>
+              </a:rPr>
+              <a:t>Tools</a:t>
+            </a:r>
+            <a:endParaRPr lang="en-US" dirty="0">
+              <a:cs typeface="Times New Roman"/>
+            </a:endParaRPr>
           </a:p>
         </p:txBody>
       </p:sp>

</xml_diff>